<commit_message>
graphique server/bdd + image PDO
</commit_message>
<xml_diff>
--- a/Formation de formateur.pptx
+++ b/Formation de formateur.pptx
@@ -9150,41 +9150,6 @@
       </p:sp>
       <p:sp>
         <p:nvSpPr>
-          <p:cNvPr id="3" name="Espace réservé du contenu 2">
-            <a:extLst>
-              <a:ext uri="{FF2B5EF4-FFF2-40B4-BE49-F238E27FC236}">
-                <a16:creationId xmlns:a16="http://schemas.microsoft.com/office/drawing/2014/main" id="{DE63257B-B2F0-42E9-812B-F0552352AD4C}"/>
-              </a:ext>
-            </a:extLst>
-          </p:cNvPr>
-          <p:cNvSpPr>
-            <a:spLocks noGrp="1"/>
-          </p:cNvSpPr>
-          <p:nvPr>
-            <p:ph idx="1"/>
-          </p:nvPr>
-        </p:nvSpPr>
-        <p:spPr>
-          <a:xfrm>
-            <a:off x="1367624" y="2490436"/>
-            <a:ext cx="9708995" cy="3567173"/>
-          </a:xfrm>
-        </p:spPr>
-        <p:txBody>
-          <a:bodyPr anchor="ctr">
-            <a:normAutofit/>
-          </a:bodyPr>
-          <a:lstStyle/>
-          <a:p>
-            <a:r>
-              <a:rPr lang="fr-FR" sz="2400" dirty="0"/>
-              <a:t>Image</a:t>
-            </a:r>
-          </a:p>
-        </p:txBody>
-      </p:sp>
-      <p:sp>
-        <p:nvSpPr>
           <p:cNvPr id="4" name="Espace réservé du numéro de diapositive 3">
             <a:extLst>
               <a:ext uri="{FF2B5EF4-FFF2-40B4-BE49-F238E27FC236}">
@@ -9212,6 +9177,42 @@
           </a:p>
         </p:txBody>
       </p:sp>
+      <p:pic>
+        <p:nvPicPr>
+          <p:cNvPr id="9" name="Image 8">
+            <a:extLst>
+              <a:ext uri="{FF2B5EF4-FFF2-40B4-BE49-F238E27FC236}">
+                <a16:creationId xmlns:a16="http://schemas.microsoft.com/office/drawing/2014/main" id="{4BDEAF63-58C3-4AFC-BFAD-9BBFA01E10D7}"/>
+              </a:ext>
+            </a:extLst>
+          </p:cNvPr>
+          <p:cNvPicPr>
+            <a:picLocks noChangeAspect="1"/>
+          </p:cNvPicPr>
+          <p:nvPr/>
+        </p:nvPicPr>
+        <p:blipFill>
+          <a:blip r:embed="rId2">
+            <a:extLst>
+              <a:ext uri="{28A0092B-C50C-407E-A947-70E740481C1C}">
+                <a14:useLocalDpi xmlns:a14="http://schemas.microsoft.com/office/drawing/2010/main" val="0"/>
+              </a:ext>
+            </a:extLst>
+          </a:blip>
+          <a:stretch>
+            <a:fillRect/>
+          </a:stretch>
+        </p:blipFill>
+        <p:spPr>
+          <a:xfrm>
+            <a:off x="2355274" y="2757981"/>
+            <a:ext cx="6620232" cy="3427496"/>
+          </a:xfrm>
+          <a:prstGeom prst="rect">
+            <a:avLst/>
+          </a:prstGeom>
+        </p:spPr>
+      </p:pic>
     </p:spTree>
     <p:extLst>
       <p:ext uri="{BB962C8B-B14F-4D97-AF65-F5344CB8AC3E}">

</xml_diff>

<commit_message>
Diapo ajout des consignes
</commit_message>
<xml_diff>
--- a/Formation de formateur.pptx
+++ b/Formation de formateur.pptx
@@ -5,7 +5,7 @@
     <p:sldMasterId id="2147483648" r:id="rId1"/>
   </p:sldMasterIdLst>
   <p:notesMasterIdLst>
-    <p:notesMasterId r:id="rId30"/>
+    <p:notesMasterId r:id="rId29"/>
   </p:notesMasterIdLst>
   <p:sldIdLst>
     <p:sldId id="256" r:id="rId2"/>
@@ -32,10 +32,9 @@
     <p:sldId id="281" r:id="rId23"/>
     <p:sldId id="280" r:id="rId24"/>
     <p:sldId id="285" r:id="rId25"/>
-    <p:sldId id="271" r:id="rId26"/>
-    <p:sldId id="283" r:id="rId27"/>
-    <p:sldId id="282" r:id="rId28"/>
-    <p:sldId id="284" r:id="rId29"/>
+    <p:sldId id="283" r:id="rId26"/>
+    <p:sldId id="282" r:id="rId27"/>
+    <p:sldId id="284" r:id="rId28"/>
   </p:sldIdLst>
   <p:sldSz cx="12192000" cy="6858000"/>
   <p:notesSz cx="6858000" cy="9144000"/>
@@ -152,20 +151,6 @@
     </p:extLst>
   </p:cmAuthor>
 </p:cmAuthorLst>
-</file>
-
-<file path=ppt/comments/comment1.xml><?xml version="1.0" encoding="utf-8"?>
-<p:cmLst xmlns:a="http://schemas.openxmlformats.org/drawingml/2006/main" xmlns:r="http://schemas.openxmlformats.org/officeDocument/2006/relationships" xmlns:p="http://schemas.openxmlformats.org/presentationml/2006/main">
-  <p:cm authorId="1" dt="2020-12-10T11:04:21.569" idx="1">
-    <p:pos x="10" y="10"/>
-    <p:text/>
-    <p:extLst>
-      <p:ext uri="{C676402C-5697-4E1C-873F-D02D1690AC5C}">
-        <p15:threadingInfo xmlns:p15="http://schemas.microsoft.com/office/powerpoint/2012/main" timeZoneBias="-60"/>
-      </p:ext>
-    </p:extLst>
-  </p:cm>
-</p:cmLst>
 </file>
 
 <file path=ppt/notesMasters/notesMaster1.xml><?xml version="1.0" encoding="utf-8"?>
@@ -4969,7 +4954,7 @@
         <p:spPr>
           <a:xfrm>
             <a:off x="1773578" y="2416679"/>
-            <a:ext cx="8634549" cy="461665"/>
+            <a:ext cx="9778237" cy="1200329"/>
           </a:xfrm>
           <a:prstGeom prst="rect">
             <a:avLst/>
@@ -5007,6 +4992,28 @@
               <a:t>() </a:t>
             </a:r>
           </a:p>
+          <a:p>
+            <a:pPr lvl="1"/>
+            <a:r>
+              <a:rPr lang="fr-FR" sz="2400" dirty="0" err="1"/>
+              <a:t>Prepare</a:t>
+            </a:r>
+            <a:r>
+              <a:rPr lang="fr-FR" sz="2400" dirty="0"/>
+              <a:t> : requête avec arguments en point d’interrogation</a:t>
+            </a:r>
+          </a:p>
+          <a:p>
+            <a:pPr lvl="1"/>
+            <a:r>
+              <a:rPr lang="fr-FR" sz="2400" dirty="0" err="1"/>
+              <a:t>Execute</a:t>
+            </a:r>
+            <a:r>
+              <a:rPr lang="fr-FR" sz="2400" dirty="0"/>
+              <a:t> : lance la requête et complémente les argument avec un tableau</a:t>
+            </a:r>
+          </a:p>
         </p:txBody>
       </p:sp>
       <p:sp>
@@ -5023,7 +5030,7 @@
         </p:nvSpPr>
         <p:spPr>
           <a:xfrm>
-            <a:off x="1636419" y="5158004"/>
+            <a:off x="1643551" y="5600103"/>
             <a:ext cx="8908869" cy="830997"/>
           </a:xfrm>
           <a:prstGeom prst="rect">
@@ -5070,7 +5077,7 @@
         </p:blipFill>
         <p:spPr>
           <a:xfrm>
-            <a:off x="2115789" y="3201550"/>
+            <a:off x="2050475" y="3799552"/>
             <a:ext cx="7817825" cy="1556213"/>
           </a:xfrm>
           <a:prstGeom prst="rect">
@@ -5726,7 +5733,7 @@
         <p:spPr>
           <a:xfrm>
             <a:off x="1773578" y="2416679"/>
-            <a:ext cx="8634549" cy="461665"/>
+            <a:ext cx="9778237" cy="461665"/>
           </a:xfrm>
           <a:prstGeom prst="rect">
             <a:avLst/>
@@ -5761,7 +5768,7 @@
             </a:r>
             <a:r>
               <a:rPr lang="fr-FR" sz="2400" dirty="0"/>
-              <a:t>() avec marqueurs nominatifs </a:t>
+              <a:t>() avec marqueurs nominatifs</a:t>
             </a:r>
           </a:p>
         </p:txBody>
@@ -5780,7 +5787,7 @@
         </p:nvSpPr>
         <p:spPr>
           <a:xfrm>
-            <a:off x="1636419" y="5158004"/>
+            <a:off x="1643551" y="5177260"/>
             <a:ext cx="8908869" cy="1200329"/>
           </a:xfrm>
           <a:prstGeom prst="rect">
@@ -5834,7 +5841,7 @@
         </p:blipFill>
         <p:spPr>
           <a:xfrm>
-            <a:off x="2131717" y="3164803"/>
+            <a:off x="1991468" y="3272477"/>
             <a:ext cx="8213036" cy="1520059"/>
           </a:xfrm>
           <a:prstGeom prst="rect">
@@ -7162,7 +7169,15 @@
             </a:pPr>
             <a:r>
               <a:rPr lang="fr-FR" sz="2400" dirty="0"/>
-              <a:t>Résultat : Tant que $reponse-&gt;fetch() renvoie une ligne, on push la ligne dans le tableau $data.</a:t>
+              <a:t>Résultat : Tant que $reponse-&gt;</a:t>
+            </a:r>
+            <a:r>
+              <a:rPr lang="fr-FR" sz="2400" dirty="0" err="1"/>
+              <a:t>fetch</a:t>
+            </a:r>
+            <a:r>
+              <a:rPr lang="fr-FR" sz="2400" dirty="0"/>
+              <a:t>() renvoie une ligne, on insère la ligne dans le tableau $data.</a:t>
             </a:r>
           </a:p>
           <a:p>
@@ -7236,7 +7251,7 @@
         </p:blipFill>
         <p:spPr>
           <a:xfrm>
-            <a:off x="3045041" y="2728815"/>
+            <a:off x="6524801" y="2726182"/>
             <a:ext cx="5008619" cy="1791404"/>
           </a:xfrm>
           <a:prstGeom prst="rect">
@@ -7244,6 +7259,103 @@
           </a:prstGeom>
         </p:spPr>
       </p:pic>
+      <p:sp>
+        <p:nvSpPr>
+          <p:cNvPr id="3" name="ZoneTexte 2">
+            <a:extLst>
+              <a:ext uri="{FF2B5EF4-FFF2-40B4-BE49-F238E27FC236}">
+                <a16:creationId xmlns:a16="http://schemas.microsoft.com/office/drawing/2014/main" id="{765A18F1-B2AC-4359-9580-8B8093B833AD}"/>
+              </a:ext>
+            </a:extLst>
+          </p:cNvPr>
+          <p:cNvSpPr txBox="1"/>
+          <p:nvPr/>
+        </p:nvSpPr>
+        <p:spPr>
+          <a:xfrm>
+            <a:off x="1604653" y="3042964"/>
+            <a:ext cx="4062548" cy="1200329"/>
+          </a:xfrm>
+          <a:prstGeom prst="rect">
+            <a:avLst/>
+          </a:prstGeom>
+          <a:noFill/>
+        </p:spPr>
+        <p:txBody>
+          <a:bodyPr wrap="square" rtlCol="0">
+            <a:spAutoFit/>
+          </a:bodyPr>
+          <a:lstStyle/>
+          <a:p>
+            <a:r>
+              <a:rPr lang="fr-FR" dirty="0"/>
+              <a:t>Requête = Requête PDO</a:t>
+            </a:r>
+          </a:p>
+          <a:p>
+            <a:endParaRPr lang="fr-FR" dirty="0"/>
+          </a:p>
+          <a:p>
+            <a:r>
+              <a:rPr lang="fr-FR" dirty="0"/>
+              <a:t>Tant que la requête retourne une ligne:</a:t>
+            </a:r>
+          </a:p>
+          <a:p>
+            <a:r>
+              <a:rPr lang="fr-FR" dirty="0"/>
+              <a:t>	travail avec la ligne </a:t>
+            </a:r>
+          </a:p>
+        </p:txBody>
+      </p:sp>
+      <p:sp>
+        <p:nvSpPr>
+          <p:cNvPr id="7" name="Rectangle 6">
+            <a:extLst>
+              <a:ext uri="{FF2B5EF4-FFF2-40B4-BE49-F238E27FC236}">
+                <a16:creationId xmlns:a16="http://schemas.microsoft.com/office/drawing/2014/main" id="{036E6CC5-1599-49D2-81DD-CC72BC870252}"/>
+              </a:ext>
+            </a:extLst>
+          </p:cNvPr>
+          <p:cNvSpPr/>
+          <p:nvPr/>
+        </p:nvSpPr>
+        <p:spPr>
+          <a:xfrm>
+            <a:off x="1604653" y="2899954"/>
+            <a:ext cx="4062547" cy="1569660"/>
+          </a:xfrm>
+          <a:prstGeom prst="rect">
+            <a:avLst/>
+          </a:prstGeom>
+          <a:noFill/>
+        </p:spPr>
+        <p:style>
+          <a:lnRef idx="2">
+            <a:schemeClr val="accent1">
+              <a:shade val="50000"/>
+            </a:schemeClr>
+          </a:lnRef>
+          <a:fillRef idx="1">
+            <a:schemeClr val="accent1"/>
+          </a:fillRef>
+          <a:effectRef idx="0">
+            <a:schemeClr val="accent1"/>
+          </a:effectRef>
+          <a:fontRef idx="minor">
+            <a:schemeClr val="lt1"/>
+          </a:fontRef>
+        </p:style>
+        <p:txBody>
+          <a:bodyPr rtlCol="0" anchor="ctr"/>
+          <a:lstStyle/>
+          <a:p>
+            <a:pPr algn="ctr"/>
+            <a:endParaRPr lang="fr-FR"/>
+          </a:p>
+        </p:txBody>
+      </p:sp>
     </p:spTree>
     <p:extLst>
       <p:ext uri="{BB962C8B-B14F-4D97-AF65-F5344CB8AC3E}">
@@ -7564,6 +7676,65 @@
           </a:p>
         </p:txBody>
       </p:sp>
+      <p:sp>
+        <p:nvSpPr>
+          <p:cNvPr id="6" name="Rectangle 5">
+            <a:extLst>
+              <a:ext uri="{FF2B5EF4-FFF2-40B4-BE49-F238E27FC236}">
+                <a16:creationId xmlns:a16="http://schemas.microsoft.com/office/drawing/2014/main" id="{D3AF8C91-F517-4ED9-833A-7E10D2DECE34}"/>
+              </a:ext>
+            </a:extLst>
+          </p:cNvPr>
+          <p:cNvSpPr/>
+          <p:nvPr/>
+        </p:nvSpPr>
+        <p:spPr>
+          <a:xfrm>
+            <a:off x="3045368" y="4493623"/>
+            <a:ext cx="6322422" cy="1123406"/>
+          </a:xfrm>
+          <a:prstGeom prst="rect">
+            <a:avLst/>
+          </a:prstGeom>
+          <a:solidFill>
+            <a:schemeClr val="tx2">
+              <a:lumMod val="40000"/>
+              <a:lumOff val="60000"/>
+            </a:schemeClr>
+          </a:solidFill>
+        </p:spPr>
+        <p:style>
+          <a:lnRef idx="2">
+            <a:schemeClr val="accent1">
+              <a:shade val="50000"/>
+            </a:schemeClr>
+          </a:lnRef>
+          <a:fillRef idx="1">
+            <a:schemeClr val="accent1"/>
+          </a:fillRef>
+          <a:effectRef idx="0">
+            <a:schemeClr val="accent1"/>
+          </a:effectRef>
+          <a:fontRef idx="minor">
+            <a:schemeClr val="lt1"/>
+          </a:fontRef>
+        </p:style>
+        <p:txBody>
+          <a:bodyPr rtlCol="0" anchor="ctr"/>
+          <a:lstStyle/>
+          <a:p>
+            <a:pPr algn="ctr"/>
+            <a:r>
+              <a:rPr lang="fr-FR" dirty="0">
+                <a:solidFill>
+                  <a:schemeClr val="tx1"/>
+                </a:solidFill>
+              </a:rPr>
+              <a:t>Utilisez la méthode Fetch et remplissez un tableau $data avec les données récupérées</a:t>
+            </a:r>
+          </a:p>
+        </p:txBody>
+      </p:sp>
     </p:spTree>
     <p:extLst>
       <p:ext uri="{BB962C8B-B14F-4D97-AF65-F5344CB8AC3E}">
@@ -8526,6 +8697,81 @@
           </a:p>
         </p:txBody>
       </p:sp>
+      <p:sp>
+        <p:nvSpPr>
+          <p:cNvPr id="6" name="Rectangle 5">
+            <a:extLst>
+              <a:ext uri="{FF2B5EF4-FFF2-40B4-BE49-F238E27FC236}">
+                <a16:creationId xmlns:a16="http://schemas.microsoft.com/office/drawing/2014/main" id="{E2AD160C-7220-4C60-89FA-DA3E4DF3D028}"/>
+              </a:ext>
+            </a:extLst>
+          </p:cNvPr>
+          <p:cNvSpPr/>
+          <p:nvPr/>
+        </p:nvSpPr>
+        <p:spPr>
+          <a:xfrm>
+            <a:off x="3045368" y="4493623"/>
+            <a:ext cx="6322422" cy="1123406"/>
+          </a:xfrm>
+          <a:prstGeom prst="rect">
+            <a:avLst/>
+          </a:prstGeom>
+          <a:solidFill>
+            <a:schemeClr val="tx2">
+              <a:lumMod val="40000"/>
+              <a:lumOff val="60000"/>
+            </a:schemeClr>
+          </a:solidFill>
+        </p:spPr>
+        <p:style>
+          <a:lnRef idx="2">
+            <a:schemeClr val="accent1">
+              <a:shade val="50000"/>
+            </a:schemeClr>
+          </a:lnRef>
+          <a:fillRef idx="1">
+            <a:schemeClr val="accent1"/>
+          </a:fillRef>
+          <a:effectRef idx="0">
+            <a:schemeClr val="accent1"/>
+          </a:effectRef>
+          <a:fontRef idx="minor">
+            <a:schemeClr val="lt1"/>
+          </a:fontRef>
+        </p:style>
+        <p:txBody>
+          <a:bodyPr rtlCol="0" anchor="ctr"/>
+          <a:lstStyle/>
+          <a:p>
+            <a:pPr algn="ctr"/>
+            <a:r>
+              <a:rPr lang="fr-FR" dirty="0">
+                <a:solidFill>
+                  <a:schemeClr val="tx1"/>
+                </a:solidFill>
+              </a:rPr>
+              <a:t>Utilisez la méthode </a:t>
+            </a:r>
+            <a:r>
+              <a:rPr lang="fr-FR" dirty="0" err="1">
+                <a:solidFill>
+                  <a:schemeClr val="tx1"/>
+                </a:solidFill>
+              </a:rPr>
+              <a:t>FetchAll</a:t>
+            </a:r>
+            <a:r>
+              <a:rPr lang="fr-FR" dirty="0">
+                <a:solidFill>
+                  <a:schemeClr val="tx1"/>
+                </a:solidFill>
+              </a:rPr>
+              <a:t> et remplissez le tableau $data</a:t>
+            </a:r>
+          </a:p>
+        </p:txBody>
+      </p:sp>
     </p:spTree>
     <p:extLst>
       <p:ext uri="{BB962C8B-B14F-4D97-AF65-F5344CB8AC3E}">
@@ -9485,6 +9731,65 @@
                 <a:srgbClr val="898989"/>
               </a:solidFill>
             </a:endParaRPr>
+          </a:p>
+        </p:txBody>
+      </p:sp>
+      <p:sp>
+        <p:nvSpPr>
+          <p:cNvPr id="6" name="Rectangle 5">
+            <a:extLst>
+              <a:ext uri="{FF2B5EF4-FFF2-40B4-BE49-F238E27FC236}">
+                <a16:creationId xmlns:a16="http://schemas.microsoft.com/office/drawing/2014/main" id="{168FDCC6-FFB8-4D46-889B-5BC30B3B011A}"/>
+              </a:ext>
+            </a:extLst>
+          </p:cNvPr>
+          <p:cNvSpPr/>
+          <p:nvPr/>
+        </p:nvSpPr>
+        <p:spPr>
+          <a:xfrm>
+            <a:off x="3045368" y="4493623"/>
+            <a:ext cx="6322422" cy="1123406"/>
+          </a:xfrm>
+          <a:prstGeom prst="rect">
+            <a:avLst/>
+          </a:prstGeom>
+          <a:solidFill>
+            <a:schemeClr val="tx2">
+              <a:lumMod val="40000"/>
+              <a:lumOff val="60000"/>
+            </a:schemeClr>
+          </a:solidFill>
+        </p:spPr>
+        <p:style>
+          <a:lnRef idx="2">
+            <a:schemeClr val="accent1">
+              <a:shade val="50000"/>
+            </a:schemeClr>
+          </a:lnRef>
+          <a:fillRef idx="1">
+            <a:schemeClr val="accent1"/>
+          </a:fillRef>
+          <a:effectRef idx="0">
+            <a:schemeClr val="accent1"/>
+          </a:effectRef>
+          <a:fontRef idx="minor">
+            <a:schemeClr val="lt1"/>
+          </a:fontRef>
+        </p:style>
+        <p:txBody>
+          <a:bodyPr rtlCol="0" anchor="ctr"/>
+          <a:lstStyle/>
+          <a:p>
+            <a:pPr algn="ctr"/>
+            <a:r>
+              <a:rPr lang="fr-FR" dirty="0">
+                <a:solidFill>
+                  <a:schemeClr val="tx1"/>
+                </a:solidFill>
+              </a:rPr>
+              <a:t>Tapez la requête permettant de réaliser l’insertion d’une personne</a:t>
+            </a:r>
           </a:p>
         </p:txBody>
       </p:sp>
@@ -11113,6 +11418,65 @@
           </a:p>
         </p:txBody>
       </p:sp>
+      <p:sp>
+        <p:nvSpPr>
+          <p:cNvPr id="6" name="Rectangle 5">
+            <a:extLst>
+              <a:ext uri="{FF2B5EF4-FFF2-40B4-BE49-F238E27FC236}">
+                <a16:creationId xmlns:a16="http://schemas.microsoft.com/office/drawing/2014/main" id="{2EF3BF6B-C8EF-428E-9B05-62E8C08D8ADF}"/>
+              </a:ext>
+            </a:extLst>
+          </p:cNvPr>
+          <p:cNvSpPr/>
+          <p:nvPr/>
+        </p:nvSpPr>
+        <p:spPr>
+          <a:xfrm>
+            <a:off x="3045368" y="4493623"/>
+            <a:ext cx="6322422" cy="1123406"/>
+          </a:xfrm>
+          <a:prstGeom prst="rect">
+            <a:avLst/>
+          </a:prstGeom>
+          <a:solidFill>
+            <a:schemeClr val="tx2">
+              <a:lumMod val="40000"/>
+              <a:lumOff val="60000"/>
+            </a:schemeClr>
+          </a:solidFill>
+        </p:spPr>
+        <p:style>
+          <a:lnRef idx="2">
+            <a:schemeClr val="accent1">
+              <a:shade val="50000"/>
+            </a:schemeClr>
+          </a:lnRef>
+          <a:fillRef idx="1">
+            <a:schemeClr val="accent1"/>
+          </a:fillRef>
+          <a:effectRef idx="0">
+            <a:schemeClr val="accent1"/>
+          </a:effectRef>
+          <a:fontRef idx="minor">
+            <a:schemeClr val="lt1"/>
+          </a:fontRef>
+        </p:style>
+        <p:txBody>
+          <a:bodyPr rtlCol="0" anchor="ctr"/>
+          <a:lstStyle/>
+          <a:p>
+            <a:pPr algn="ctr"/>
+            <a:r>
+              <a:rPr lang="fr-FR" dirty="0">
+                <a:solidFill>
+                  <a:schemeClr val="tx1"/>
+                </a:solidFill>
+              </a:rPr>
+              <a:t>Tapez la requête permettant de modifier l’âge d’Anthony.</a:t>
+            </a:r>
+          </a:p>
+        </p:txBody>
+      </p:sp>
     </p:spTree>
     <p:extLst>
       <p:ext uri="{BB962C8B-B14F-4D97-AF65-F5344CB8AC3E}">
@@ -12075,6 +12439,65 @@
           </a:p>
         </p:txBody>
       </p:sp>
+      <p:sp>
+        <p:nvSpPr>
+          <p:cNvPr id="6" name="Rectangle 5">
+            <a:extLst>
+              <a:ext uri="{FF2B5EF4-FFF2-40B4-BE49-F238E27FC236}">
+                <a16:creationId xmlns:a16="http://schemas.microsoft.com/office/drawing/2014/main" id="{8AAAAB16-5B21-4753-9C39-67F8638F1F12}"/>
+              </a:ext>
+            </a:extLst>
+          </p:cNvPr>
+          <p:cNvSpPr/>
+          <p:nvPr/>
+        </p:nvSpPr>
+        <p:spPr>
+          <a:xfrm>
+            <a:off x="3045368" y="4493623"/>
+            <a:ext cx="6322422" cy="1123406"/>
+          </a:xfrm>
+          <a:prstGeom prst="rect">
+            <a:avLst/>
+          </a:prstGeom>
+          <a:solidFill>
+            <a:schemeClr val="tx2">
+              <a:lumMod val="40000"/>
+              <a:lumOff val="60000"/>
+            </a:schemeClr>
+          </a:solidFill>
+        </p:spPr>
+        <p:style>
+          <a:lnRef idx="2">
+            <a:schemeClr val="accent1">
+              <a:shade val="50000"/>
+            </a:schemeClr>
+          </a:lnRef>
+          <a:fillRef idx="1">
+            <a:schemeClr val="accent1"/>
+          </a:fillRef>
+          <a:effectRef idx="0">
+            <a:schemeClr val="accent1"/>
+          </a:effectRef>
+          <a:fontRef idx="minor">
+            <a:schemeClr val="lt1"/>
+          </a:fontRef>
+        </p:style>
+        <p:txBody>
+          <a:bodyPr rtlCol="0" anchor="ctr"/>
+          <a:lstStyle/>
+          <a:p>
+            <a:pPr algn="ctr"/>
+            <a:r>
+              <a:rPr lang="fr-FR" dirty="0">
+                <a:solidFill>
+                  <a:schemeClr val="tx1"/>
+                </a:solidFill>
+              </a:rPr>
+              <a:t>Tapez la requête permettant de vous supprimer de la table personne</a:t>
+            </a:r>
+          </a:p>
+        </p:txBody>
+      </p:sp>
     </p:spTree>
     <p:extLst>
       <p:ext uri="{BB962C8B-B14F-4D97-AF65-F5344CB8AC3E}">
@@ -12760,10 +13183,10 @@
       </p:sp>
       <p:pic>
         <p:nvPicPr>
-          <p:cNvPr id="5" name="Image 4">
-            <a:extLst>
-              <a:ext uri="{FF2B5EF4-FFF2-40B4-BE49-F238E27FC236}">
-                <a16:creationId xmlns:a16="http://schemas.microsoft.com/office/drawing/2014/main" id="{1AAD2B04-C2C5-4A0B-8CAA-4C057964031B}"/>
+          <p:cNvPr id="4" name="Image 3">
+            <a:extLst>
+              <a:ext uri="{FF2B5EF4-FFF2-40B4-BE49-F238E27FC236}">
+                <a16:creationId xmlns:a16="http://schemas.microsoft.com/office/drawing/2014/main" id="{BD690AE1-2149-4045-A5D0-7766F2AB6BE6}"/>
               </a:ext>
             </a:extLst>
           </p:cNvPr>
@@ -12780,8 +13203,8 @@
         </p:blipFill>
         <p:spPr>
           <a:xfrm>
-            <a:off x="409710" y="4001257"/>
-            <a:ext cx="6051163" cy="2355093"/>
+            <a:off x="7642094" y="3731335"/>
+            <a:ext cx="2211590" cy="2643439"/>
           </a:xfrm>
           <a:prstGeom prst="rect">
             <a:avLst/>
@@ -12790,30 +13213,153 @@
       </p:pic>
       <p:sp>
         <p:nvSpPr>
-          <p:cNvPr id="11" name="Rectangle 10">
-            <a:extLst>
-              <a:ext uri="{FF2B5EF4-FFF2-40B4-BE49-F238E27FC236}">
-                <a16:creationId xmlns:a16="http://schemas.microsoft.com/office/drawing/2014/main" id="{3035282F-C7AB-461D-9B8A-3DE1D5736351}"/>
-              </a:ext>
-            </a:extLst>
-          </p:cNvPr>
-          <p:cNvSpPr/>
+          <p:cNvPr id="6" name="ZoneTexte 5">
+            <a:extLst>
+              <a:ext uri="{FF2B5EF4-FFF2-40B4-BE49-F238E27FC236}">
+                <a16:creationId xmlns:a16="http://schemas.microsoft.com/office/drawing/2014/main" id="{1E4AC992-B3A3-471B-B825-F20BF6C63A4C}"/>
+              </a:ext>
+            </a:extLst>
+          </p:cNvPr>
+          <p:cNvSpPr txBox="1"/>
           <p:nvPr/>
         </p:nvSpPr>
         <p:spPr>
           <a:xfrm>
-            <a:off x="958506" y="5558828"/>
-            <a:ext cx="1576464" cy="276822"/>
+            <a:off x="812935" y="4082824"/>
+            <a:ext cx="4844956" cy="2246769"/>
           </a:xfrm>
           <a:prstGeom prst="rect">
             <a:avLst/>
           </a:prstGeom>
           <a:noFill/>
-          <a:ln w="19050">
-            <a:solidFill>
-              <a:srgbClr val="FF0000"/>
-            </a:solidFill>
+        </p:spPr>
+        <p:txBody>
+          <a:bodyPr wrap="square" rtlCol="0">
+            <a:spAutoFit/>
+          </a:bodyPr>
+          <a:lstStyle/>
+          <a:p>
+            <a:r>
+              <a:rPr lang="fr-FR" sz="2000" dirty="0"/>
+              <a:t>Résultat = </a:t>
+            </a:r>
+            <a:r>
+              <a:rPr lang="fr-FR" sz="2000" dirty="0" err="1"/>
+              <a:t>Requete</a:t>
+            </a:r>
+            <a:r>
+              <a:rPr lang="fr-FR" sz="2000" dirty="0"/>
+              <a:t> statut des </a:t>
+            </a:r>
+            <a:r>
+              <a:rPr lang="fr-FR" sz="2000" dirty="0" err="1"/>
+              <a:t>personneS</a:t>
+            </a:r>
+            <a:endParaRPr lang="fr-FR" sz="2000" dirty="0"/>
+          </a:p>
+          <a:p>
+            <a:endParaRPr lang="fr-FR" sz="2000" dirty="0"/>
+          </a:p>
+          <a:p>
+            <a:r>
+              <a:rPr lang="fr-FR" sz="2000" dirty="0"/>
+              <a:t>Pour chaque personne dans </a:t>
+            </a:r>
+            <a:r>
+              <a:rPr lang="fr-FR" sz="2000" dirty="0" err="1"/>
+              <a:t>personneS</a:t>
+            </a:r>
+            <a:r>
+              <a:rPr lang="fr-FR" sz="2000" dirty="0"/>
+              <a:t> :</a:t>
+            </a:r>
+          </a:p>
+          <a:p>
+            <a:r>
+              <a:rPr lang="fr-FR" sz="2000" dirty="0"/>
+              <a:t>	Si statut des personne = Etudiant</a:t>
+            </a:r>
+          </a:p>
+          <a:p>
+            <a:r>
+              <a:rPr lang="fr-FR" sz="2000" dirty="0"/>
+              <a:t>		Affiche en bleu</a:t>
+            </a:r>
+          </a:p>
+          <a:p>
+            <a:r>
+              <a:rPr lang="fr-FR" sz="2000" dirty="0"/>
+              <a:t>	Si statut des personne = Professeur</a:t>
+            </a:r>
+          </a:p>
+          <a:p>
+            <a:r>
+              <a:rPr lang="fr-FR" sz="2000" dirty="0"/>
+              <a:t>		Affiche en noir</a:t>
+            </a:r>
+          </a:p>
+        </p:txBody>
+      </p:sp>
+      <p:cxnSp>
+        <p:nvCxnSpPr>
+          <p:cNvPr id="13" name="Connecteur droit avec flèche 12">
+            <a:extLst>
+              <a:ext uri="{FF2B5EF4-FFF2-40B4-BE49-F238E27FC236}">
+                <a16:creationId xmlns:a16="http://schemas.microsoft.com/office/drawing/2014/main" id="{6E5256C3-7BAB-4B0A-A4C6-827C61D0A18B}"/>
+              </a:ext>
+            </a:extLst>
+          </p:cNvPr>
+          <p:cNvCxnSpPr/>
+          <p:nvPr/>
+        </p:nvCxnSpPr>
+        <p:spPr>
+          <a:xfrm>
+            <a:off x="5773003" y="4940490"/>
+            <a:ext cx="1501254" cy="0"/>
+          </a:xfrm>
+          <a:prstGeom prst="straightConnector1">
+            <a:avLst/>
+          </a:prstGeom>
+          <a:ln>
+            <a:tailEnd type="triangle"/>
           </a:ln>
+        </p:spPr>
+        <p:style>
+          <a:lnRef idx="1">
+            <a:schemeClr val="accent1"/>
+          </a:lnRef>
+          <a:fillRef idx="0">
+            <a:schemeClr val="accent1"/>
+          </a:fillRef>
+          <a:effectRef idx="0">
+            <a:schemeClr val="accent1"/>
+          </a:effectRef>
+          <a:fontRef idx="minor">
+            <a:schemeClr val="tx1"/>
+          </a:fontRef>
+        </p:style>
+      </p:cxnSp>
+      <p:sp>
+        <p:nvSpPr>
+          <p:cNvPr id="15" name="Rectangle 14">
+            <a:extLst>
+              <a:ext uri="{FF2B5EF4-FFF2-40B4-BE49-F238E27FC236}">
+                <a16:creationId xmlns:a16="http://schemas.microsoft.com/office/drawing/2014/main" id="{5ADF4566-1D07-46CE-AD8B-DEA8D418F10C}"/>
+              </a:ext>
+            </a:extLst>
+          </p:cNvPr>
+          <p:cNvSpPr/>
+          <p:nvPr/>
+        </p:nvSpPr>
+        <p:spPr>
+          <a:xfrm>
+            <a:off x="728797" y="3971109"/>
+            <a:ext cx="5044206" cy="2547249"/>
+          </a:xfrm>
+          <a:prstGeom prst="rect">
+            <a:avLst/>
+          </a:prstGeom>
+          <a:noFill/>
         </p:spPr>
         <p:style>
           <a:lnRef idx="2">
@@ -12840,129 +13386,6 @@
           </a:p>
         </p:txBody>
       </p:sp>
-      <p:pic>
-        <p:nvPicPr>
-          <p:cNvPr id="20" name="Image 19">
-            <a:extLst>
-              <a:ext uri="{FF2B5EF4-FFF2-40B4-BE49-F238E27FC236}">
-                <a16:creationId xmlns:a16="http://schemas.microsoft.com/office/drawing/2014/main" id="{070E2CF2-AC1B-4DCD-8D05-A6492D885CC1}"/>
-              </a:ext>
-            </a:extLst>
-          </p:cNvPr>
-          <p:cNvPicPr>
-            <a:picLocks noChangeAspect="1"/>
-          </p:cNvPicPr>
-          <p:nvPr/>
-        </p:nvPicPr>
-        <p:blipFill>
-          <a:blip r:embed="rId3"/>
-          <a:stretch>
-            <a:fillRect/>
-          </a:stretch>
-        </p:blipFill>
-        <p:spPr>
-          <a:xfrm>
-            <a:off x="8131863" y="4430986"/>
-            <a:ext cx="3419952" cy="1495634"/>
-          </a:xfrm>
-          <a:prstGeom prst="rect">
-            <a:avLst/>
-          </a:prstGeom>
-        </p:spPr>
-      </p:pic>
-      <p:sp>
-        <p:nvSpPr>
-          <p:cNvPr id="21" name="Rectangle 20">
-            <a:extLst>
-              <a:ext uri="{FF2B5EF4-FFF2-40B4-BE49-F238E27FC236}">
-                <a16:creationId xmlns:a16="http://schemas.microsoft.com/office/drawing/2014/main" id="{73D8A52F-0E8A-4261-91B6-CC6115739828}"/>
-              </a:ext>
-            </a:extLst>
-          </p:cNvPr>
-          <p:cNvSpPr/>
-          <p:nvPr/>
-        </p:nvSpPr>
-        <p:spPr>
-          <a:xfrm>
-            <a:off x="8131863" y="4430986"/>
-            <a:ext cx="3419952" cy="1541457"/>
-          </a:xfrm>
-          <a:prstGeom prst="rect">
-            <a:avLst/>
-          </a:prstGeom>
-          <a:noFill/>
-          <a:ln>
-            <a:solidFill>
-              <a:schemeClr val="tx1"/>
-            </a:solidFill>
-          </a:ln>
-        </p:spPr>
-        <p:style>
-          <a:lnRef idx="2">
-            <a:schemeClr val="accent1">
-              <a:shade val="50000"/>
-            </a:schemeClr>
-          </a:lnRef>
-          <a:fillRef idx="1">
-            <a:schemeClr val="accent1"/>
-          </a:fillRef>
-          <a:effectRef idx="0">
-            <a:schemeClr val="accent1"/>
-          </a:effectRef>
-          <a:fontRef idx="minor">
-            <a:schemeClr val="lt1"/>
-          </a:fontRef>
-        </p:style>
-        <p:txBody>
-          <a:bodyPr rtlCol="0" anchor="ctr"/>
-          <a:lstStyle/>
-          <a:p>
-            <a:pPr algn="ctr"/>
-            <a:endParaRPr lang="fr-FR"/>
-          </a:p>
-        </p:txBody>
-      </p:sp>
-      <p:cxnSp>
-        <p:nvCxnSpPr>
-          <p:cNvPr id="23" name="Connecteur droit avec flèche 22">
-            <a:extLst>
-              <a:ext uri="{FF2B5EF4-FFF2-40B4-BE49-F238E27FC236}">
-                <a16:creationId xmlns:a16="http://schemas.microsoft.com/office/drawing/2014/main" id="{34E6468E-C2A1-4D59-A9ED-BD3D6F23123C}"/>
-              </a:ext>
-            </a:extLst>
-          </p:cNvPr>
-          <p:cNvCxnSpPr>
-            <a:stCxn id="5" idx="3"/>
-          </p:cNvCxnSpPr>
-          <p:nvPr/>
-        </p:nvCxnSpPr>
-        <p:spPr>
-          <a:xfrm>
-            <a:off x="6460873" y="5178804"/>
-            <a:ext cx="1550613" cy="5592"/>
-          </a:xfrm>
-          <a:prstGeom prst="straightConnector1">
-            <a:avLst/>
-          </a:prstGeom>
-          <a:ln>
-            <a:tailEnd type="triangle"/>
-          </a:ln>
-        </p:spPr>
-        <p:style>
-          <a:lnRef idx="1">
-            <a:schemeClr val="accent1"/>
-          </a:lnRef>
-          <a:fillRef idx="0">
-            <a:schemeClr val="accent1"/>
-          </a:fillRef>
-          <a:effectRef idx="0">
-            <a:schemeClr val="accent1"/>
-          </a:effectRef>
-          <a:fontRef idx="minor">
-            <a:schemeClr val="tx1"/>
-          </a:fontRef>
-        </p:style>
-      </p:cxnSp>
     </p:spTree>
     <p:extLst>
       <p:ext uri="{BB962C8B-B14F-4D97-AF65-F5344CB8AC3E}">
@@ -13593,10 +14016,10 @@
       </p:sp>
       <p:pic>
         <p:nvPicPr>
-          <p:cNvPr id="6" name="Image 5">
-            <a:extLst>
-              <a:ext uri="{FF2B5EF4-FFF2-40B4-BE49-F238E27FC236}">
-                <a16:creationId xmlns:a16="http://schemas.microsoft.com/office/drawing/2014/main" id="{A93DDAC7-B5EB-4C2A-8CB1-AAC676BFC595}"/>
+          <p:cNvPr id="3" name="Image 2">
+            <a:extLst>
+              <a:ext uri="{FF2B5EF4-FFF2-40B4-BE49-F238E27FC236}">
+                <a16:creationId xmlns:a16="http://schemas.microsoft.com/office/drawing/2014/main" id="{F0C0BE9A-E407-4B17-9423-9830E515AA8F}"/>
               </a:ext>
             </a:extLst>
           </p:cNvPr>
@@ -13613,20 +14036,50 @@
         </p:blipFill>
         <p:spPr>
           <a:xfrm>
-            <a:off x="764516" y="3429000"/>
-            <a:ext cx="7020905" cy="2876951"/>
+            <a:off x="3193117" y="3533187"/>
+            <a:ext cx="4661247" cy="867787"/>
           </a:xfrm>
           <a:prstGeom prst="rect">
             <a:avLst/>
           </a:prstGeom>
         </p:spPr>
       </p:pic>
-      <p:sp>
-        <p:nvSpPr>
-          <p:cNvPr id="7" name="ZoneTexte 6">
-            <a:extLst>
-              <a:ext uri="{FF2B5EF4-FFF2-40B4-BE49-F238E27FC236}">
-                <a16:creationId xmlns:a16="http://schemas.microsoft.com/office/drawing/2014/main" id="{2A74C213-DC6C-4815-8B15-85F46D4B3F01}"/>
+      <p:pic>
+        <p:nvPicPr>
+          <p:cNvPr id="4" name="Image 3">
+            <a:extLst>
+              <a:ext uri="{FF2B5EF4-FFF2-40B4-BE49-F238E27FC236}">
+                <a16:creationId xmlns:a16="http://schemas.microsoft.com/office/drawing/2014/main" id="{5DB3E138-74B9-4B9A-95FE-BCA971C31E1F}"/>
+              </a:ext>
+            </a:extLst>
+          </p:cNvPr>
+          <p:cNvPicPr>
+            <a:picLocks noChangeAspect="1"/>
+          </p:cNvPicPr>
+          <p:nvPr/>
+        </p:nvPicPr>
+        <p:blipFill>
+          <a:blip r:embed="rId3"/>
+          <a:stretch>
+            <a:fillRect/>
+          </a:stretch>
+        </p:blipFill>
+        <p:spPr>
+          <a:xfrm>
+            <a:off x="2855409" y="5217291"/>
+            <a:ext cx="5575490" cy="824392"/>
+          </a:xfrm>
+          <a:prstGeom prst="rect">
+            <a:avLst/>
+          </a:prstGeom>
+        </p:spPr>
+      </p:pic>
+      <p:sp>
+        <p:nvSpPr>
+          <p:cNvPr id="5" name="ZoneTexte 4">
+            <a:extLst>
+              <a:ext uri="{FF2B5EF4-FFF2-40B4-BE49-F238E27FC236}">
+                <a16:creationId xmlns:a16="http://schemas.microsoft.com/office/drawing/2014/main" id="{546CC5B9-EDB3-4C59-B3F3-B33B8D1E8871}"/>
               </a:ext>
             </a:extLst>
           </p:cNvPr>
@@ -13635,8 +14088,8 @@
         </p:nvSpPr>
         <p:spPr>
           <a:xfrm>
-            <a:off x="1603218" y="2543175"/>
-            <a:ext cx="6844420" cy="461665"/>
+            <a:off x="2390503" y="2543175"/>
+            <a:ext cx="6505303" cy="461665"/>
           </a:xfrm>
           <a:prstGeom prst="rect">
             <a:avLst/>
@@ -13649,142 +14102,9 @@
           </a:bodyPr>
           <a:lstStyle/>
           <a:p>
-            <a:pPr marL="285750" indent="-285750">
-              <a:buFont typeface="Arial" panose="020B0604020202020204" pitchFamily="34" charset="0"/>
-              <a:buChar char="•"/>
-            </a:pPr>
             <a:r>
               <a:rPr lang="fr-FR" sz="2400" dirty="0"/>
-              <a:t>Lier le CSS a son fichier HTML</a:t>
-            </a:r>
-          </a:p>
-        </p:txBody>
-      </p:sp>
-      <p:sp>
-        <p:nvSpPr>
-          <p:cNvPr id="13" name="Rectangle 12">
-            <a:extLst>
-              <a:ext uri="{FF2B5EF4-FFF2-40B4-BE49-F238E27FC236}">
-                <a16:creationId xmlns:a16="http://schemas.microsoft.com/office/drawing/2014/main" id="{F59A8E9F-ED6F-4D84-86A2-4AB75966D648}"/>
-              </a:ext>
-            </a:extLst>
-          </p:cNvPr>
-          <p:cNvSpPr/>
-          <p:nvPr/>
-        </p:nvSpPr>
-        <p:spPr>
-          <a:xfrm>
-            <a:off x="1367406" y="4186106"/>
-            <a:ext cx="3196205" cy="234892"/>
-          </a:xfrm>
-          <a:prstGeom prst="rect">
-            <a:avLst/>
-          </a:prstGeom>
-          <a:noFill/>
-          <a:ln>
-            <a:solidFill>
-              <a:srgbClr val="FF0000"/>
-            </a:solidFill>
-          </a:ln>
-        </p:spPr>
-        <p:style>
-          <a:lnRef idx="2">
-            <a:schemeClr val="accent1">
-              <a:shade val="50000"/>
-            </a:schemeClr>
-          </a:lnRef>
-          <a:fillRef idx="1">
-            <a:schemeClr val="accent1"/>
-          </a:fillRef>
-          <a:effectRef idx="0">
-            <a:schemeClr val="accent1"/>
-          </a:effectRef>
-          <a:fontRef idx="minor">
-            <a:schemeClr val="lt1"/>
-          </a:fontRef>
-        </p:style>
-        <p:txBody>
-          <a:bodyPr rtlCol="0" anchor="ctr"/>
-          <a:lstStyle/>
-          <a:p>
-            <a:pPr algn="ctr"/>
-            <a:endParaRPr lang="fr-FR"/>
-          </a:p>
-        </p:txBody>
-      </p:sp>
-      <p:cxnSp>
-        <p:nvCxnSpPr>
-          <p:cNvPr id="17" name="Connecteur droit avec flèche 16">
-            <a:extLst>
-              <a:ext uri="{FF2B5EF4-FFF2-40B4-BE49-F238E27FC236}">
-                <a16:creationId xmlns:a16="http://schemas.microsoft.com/office/drawing/2014/main" id="{734CED9D-45D3-4ED9-AB97-5A985157260B}"/>
-              </a:ext>
-            </a:extLst>
-          </p:cNvPr>
-          <p:cNvCxnSpPr/>
-          <p:nvPr/>
-        </p:nvCxnSpPr>
-        <p:spPr>
-          <a:xfrm flipH="1">
-            <a:off x="4563611" y="4260118"/>
-            <a:ext cx="3456264" cy="0"/>
-          </a:xfrm>
-          <a:prstGeom prst="straightConnector1">
-            <a:avLst/>
-          </a:prstGeom>
-          <a:ln>
-            <a:solidFill>
-              <a:srgbClr val="FF0000"/>
-            </a:solidFill>
-            <a:tailEnd type="triangle"/>
-          </a:ln>
-        </p:spPr>
-        <p:style>
-          <a:lnRef idx="1">
-            <a:schemeClr val="accent1"/>
-          </a:lnRef>
-          <a:fillRef idx="0">
-            <a:schemeClr val="accent1"/>
-          </a:fillRef>
-          <a:effectRef idx="0">
-            <a:schemeClr val="accent1"/>
-          </a:effectRef>
-          <a:fontRef idx="minor">
-            <a:schemeClr val="tx1"/>
-          </a:fontRef>
-        </p:style>
-      </p:cxnSp>
-      <p:sp>
-        <p:nvSpPr>
-          <p:cNvPr id="19" name="ZoneTexte 18">
-            <a:extLst>
-              <a:ext uri="{FF2B5EF4-FFF2-40B4-BE49-F238E27FC236}">
-                <a16:creationId xmlns:a16="http://schemas.microsoft.com/office/drawing/2014/main" id="{2CA6A347-8493-49AE-B95A-421FD123E654}"/>
-              </a:ext>
-            </a:extLst>
-          </p:cNvPr>
-          <p:cNvSpPr txBox="1"/>
-          <p:nvPr/>
-        </p:nvSpPr>
-        <p:spPr>
-          <a:xfrm>
-            <a:off x="8095376" y="3892492"/>
-            <a:ext cx="3456264" cy="923330"/>
-          </a:xfrm>
-          <a:prstGeom prst="rect">
-            <a:avLst/>
-          </a:prstGeom>
-          <a:noFill/>
-        </p:spPr>
-        <p:txBody>
-          <a:bodyPr wrap="square" rtlCol="0">
-            <a:spAutoFit/>
-          </a:bodyPr>
-          <a:lstStyle/>
-          <a:p>
-            <a:r>
-              <a:rPr lang="fr-FR" dirty="0"/>
-              <a:t>Le fichier HTML est associé a un fichier « style.css » chargé de la mise en forme.</a:t>
+              <a:t>Exemple avec du CSS intégré aux balises HTML </a:t>
             </a:r>
           </a:p>
         </p:txBody>
@@ -13827,12 +14147,12 @@
           <a:chExt cx="0" cy="0"/>
         </a:xfrm>
       </p:grpSpPr>
-      <p:sp useBgFill="1">
-        <p:nvSpPr>
-          <p:cNvPr id="8" name="Rectangle 7">
-            <a:extLst>
-              <a:ext uri="{FF2B5EF4-FFF2-40B4-BE49-F238E27FC236}">
-                <a16:creationId xmlns:a16="http://schemas.microsoft.com/office/drawing/2014/main" id="{827B839B-9ADE-406B-8590-F1CAEDED45A1}"/>
+      <p:sp>
+        <p:nvSpPr>
+          <p:cNvPr id="9" name="Rectangle 8">
+            <a:extLst>
+              <a:ext uri="{FF2B5EF4-FFF2-40B4-BE49-F238E27FC236}">
+                <a16:creationId xmlns:a16="http://schemas.microsoft.com/office/drawing/2014/main" id="{23962611-DFD5-4092-AAFD-559E3DFCE2C9}"/>
               </a:ext>
               <a:ext uri="{C183D7F6-B498-43B3-948B-1728B52AA6E4}">
                 <adec:decorative xmlns:adec="http://schemas.microsoft.com/office/drawing/2017/decorative" val="1"/>
@@ -13852,12 +14172,37 @@
         </p:nvSpPr>
         <p:spPr>
           <a:xfrm>
-            <a:off x="0" y="0"/>
-            <a:ext cx="12188952" cy="6858000"/>
+            <a:off x="475488" y="0"/>
+            <a:ext cx="10910292" cy="6858000"/>
           </a:xfrm>
           <a:prstGeom prst="rect">
             <a:avLst/>
           </a:prstGeom>
+          <a:gradFill>
+            <a:gsLst>
+              <a:gs pos="0">
+                <a:schemeClr val="accent1">
+                  <a:lumMod val="90000"/>
+                </a:schemeClr>
+              </a:gs>
+              <a:gs pos="25000">
+                <a:schemeClr val="accent1">
+                  <a:lumMod val="90000"/>
+                </a:schemeClr>
+              </a:gs>
+              <a:gs pos="94000">
+                <a:schemeClr val="bg2">
+                  <a:lumMod val="25000"/>
+                </a:schemeClr>
+              </a:gs>
+              <a:gs pos="100000">
+                <a:schemeClr val="bg2">
+                  <a:lumMod val="25000"/>
+                </a:schemeClr>
+              </a:gs>
+            </a:gsLst>
+            <a:lin ang="4200000" scaled="0"/>
+          </a:gradFill>
           <a:ln>
             <a:noFill/>
           </a:ln>
@@ -13887,21 +14232,21 @@
           </a:p>
         </p:txBody>
       </p:sp>
-      <p:sp>
-        <p:nvSpPr>
-          <p:cNvPr id="10" name="Freeform 45">
-            <a:extLst>
-              <a:ext uri="{FF2B5EF4-FFF2-40B4-BE49-F238E27FC236}">
-                <a16:creationId xmlns:a16="http://schemas.microsoft.com/office/drawing/2014/main" id="{CFE45BF0-46DB-408C-B5F7-7B11716805D4}"/>
+      <p:pic>
+        <p:nvPicPr>
+          <p:cNvPr id="11" name="Picture 10">
+            <a:extLst>
+              <a:ext uri="{FF2B5EF4-FFF2-40B4-BE49-F238E27FC236}">
+                <a16:creationId xmlns:a16="http://schemas.microsoft.com/office/drawing/2014/main" id="{2270F1FA-0425-408F-9861-80BF5AFB276D}"/>
               </a:ext>
               <a:ext uri="{C183D7F6-B498-43B3-948B-1728B52AA6E4}">
                 <adec:decorative xmlns:adec="http://schemas.microsoft.com/office/drawing/2017/decorative" val="1"/>
               </a:ext>
             </a:extLst>
           </p:cNvPr>
-          <p:cNvSpPr>
-            <a:spLocks noGrp="1" noRot="1" noChangeAspect="1" noMove="1" noResize="1" noEditPoints="1" noAdjustHandles="1" noChangeArrowheads="1" noChangeShapeType="1" noTextEdit="1"/>
-          </p:cNvSpPr>
+          <p:cNvPicPr>
+            <a:picLocks noGrp="1" noRot="1" noChangeAspect="1" noMove="1" noResize="1" noEditPoints="1" noAdjustHandles="1" noChangeArrowheads="1" noChangeShapeType="1" noCrop="1"/>
+          </p:cNvPicPr>
           <p:nvPr>
             <p:extLst>
               <p:ext uri="{386F3935-93C4-4BCD-93E2-E3B085C9AB24}">
@@ -13909,630 +14254,152 @@
               </p:ext>
             </p:extLst>
           </p:nvPr>
-        </p:nvSpPr>
-        <p:spPr bwMode="auto">
-          <a:xfrm>
-            <a:off x="409710" y="1022350"/>
-            <a:ext cx="709612" cy="2095501"/>
-          </a:xfrm>
-          <a:custGeom>
-            <a:avLst/>
-            <a:gdLst>
-              <a:gd name="T0" fmla="*/ 447 w 447"/>
-              <a:gd name="T1" fmla="*/ 1363 h 1363"/>
-              <a:gd name="T2" fmla="*/ 0 w 447"/>
-              <a:gd name="T3" fmla="*/ 987 h 1363"/>
-              <a:gd name="T4" fmla="*/ 0 w 447"/>
-              <a:gd name="T5" fmla="*/ 0 h 1363"/>
-              <a:gd name="T6" fmla="*/ 447 w 447"/>
-              <a:gd name="T7" fmla="*/ 376 h 1363"/>
-              <a:gd name="T8" fmla="*/ 447 w 447"/>
-              <a:gd name="T9" fmla="*/ 1363 h 1363"/>
-            </a:gdLst>
-            <a:ahLst/>
-            <a:cxnLst>
-              <a:cxn ang="0">
-                <a:pos x="T0" y="T1"/>
-              </a:cxn>
-              <a:cxn ang="0">
-                <a:pos x="T2" y="T3"/>
-              </a:cxn>
-              <a:cxn ang="0">
-                <a:pos x="T4" y="T5"/>
-              </a:cxn>
-              <a:cxn ang="0">
-                <a:pos x="T6" y="T7"/>
-              </a:cxn>
-              <a:cxn ang="0">
-                <a:pos x="T8" y="T9"/>
-              </a:cxn>
-            </a:cxnLst>
-            <a:rect l="0" t="0" r="r" b="b"/>
-            <a:pathLst>
-              <a:path w="447" h="1363">
-                <a:moveTo>
-                  <a:pt x="447" y="1363"/>
-                </a:moveTo>
-                <a:lnTo>
-                  <a:pt x="0" y="987"/>
-                </a:lnTo>
-                <a:lnTo>
-                  <a:pt x="0" y="0"/>
-                </a:lnTo>
-                <a:lnTo>
-                  <a:pt x="447" y="376"/>
-                </a:lnTo>
-                <a:lnTo>
-                  <a:pt x="447" y="1363"/>
-                </a:lnTo>
-                <a:close/>
-              </a:path>
-            </a:pathLst>
-          </a:custGeom>
-          <a:solidFill>
-            <a:schemeClr val="accent1">
-              <a:lumMod val="50000"/>
-            </a:schemeClr>
-          </a:solidFill>
-          <a:ln>
-            <a:noFill/>
-          </a:ln>
-        </p:spPr>
-        <p:txBody>
-          <a:bodyPr vert="horz" wrap="square" lIns="91440" tIns="45720" rIns="91440" bIns="45720" numCol="1" anchor="t" anchorCtr="0" compatLnSpc="1">
-            <a:prstTxWarp prst="textNoShape">
-              <a:avLst/>
-            </a:prstTxWarp>
-          </a:bodyPr>
-          <a:lstStyle/>
-          <a:p>
-            <a:endParaRPr lang="en-US"/>
-          </a:p>
-        </p:txBody>
-      </p:sp>
-      <p:sp>
-        <p:nvSpPr>
-          <p:cNvPr id="12" name="Freeform 46">
-            <a:extLst>
-              <a:ext uri="{FF2B5EF4-FFF2-40B4-BE49-F238E27FC236}">
-                <a16:creationId xmlns:a16="http://schemas.microsoft.com/office/drawing/2014/main" id="{2AEBC8F2-97B1-41B4-93F1-2D289E197FBA}"/>
-              </a:ext>
-              <a:ext uri="{C183D7F6-B498-43B3-948B-1728B52AA6E4}">
-                <adec:decorative xmlns:adec="http://schemas.microsoft.com/office/drawing/2017/decorative" val="1"/>
-              </a:ext>
-            </a:extLst>
-          </p:cNvPr>
-          <p:cNvSpPr>
-            <a:spLocks noGrp="1" noRot="1" noChangeAspect="1" noMove="1" noResize="1" noEditPoints="1" noAdjustHandles="1" noChangeArrowheads="1" noChangeShapeType="1" noTextEdit="1"/>
-          </p:cNvSpPr>
-          <p:nvPr>
-            <p:extLst>
-              <p:ext uri="{386F3935-93C4-4BCD-93E2-E3B085C9AB24}">
-                <p16:designElem xmlns:p16="http://schemas.microsoft.com/office/powerpoint/2015/main" val="1"/>
-              </p:ext>
-            </p:extLst>
-          </p:nvPr>
-        </p:nvSpPr>
-        <p:spPr bwMode="auto">
-          <a:xfrm>
-            <a:off x="409710" y="837744"/>
-            <a:ext cx="403225" cy="1705431"/>
-          </a:xfrm>
-          <a:custGeom>
-            <a:avLst/>
-            <a:gdLst>
-              <a:gd name="T0" fmla="*/ 254 w 254"/>
-              <a:gd name="T1" fmla="*/ 987 h 1109"/>
-              <a:gd name="T2" fmla="*/ 0 w 254"/>
-              <a:gd name="T3" fmla="*/ 1109 h 1109"/>
-              <a:gd name="T4" fmla="*/ 0 w 254"/>
-              <a:gd name="T5" fmla="*/ 119 h 1109"/>
-              <a:gd name="T6" fmla="*/ 254 w 254"/>
-              <a:gd name="T7" fmla="*/ 0 h 1109"/>
-              <a:gd name="T8" fmla="*/ 254 w 254"/>
-              <a:gd name="T9" fmla="*/ 987 h 1109"/>
-            </a:gdLst>
-            <a:ahLst/>
-            <a:cxnLst>
-              <a:cxn ang="0">
-                <a:pos x="T0" y="T1"/>
-              </a:cxn>
-              <a:cxn ang="0">
-                <a:pos x="T2" y="T3"/>
-              </a:cxn>
-              <a:cxn ang="0">
-                <a:pos x="T4" y="T5"/>
-              </a:cxn>
-              <a:cxn ang="0">
-                <a:pos x="T6" y="T7"/>
-              </a:cxn>
-              <a:cxn ang="0">
-                <a:pos x="T8" y="T9"/>
-              </a:cxn>
-            </a:cxnLst>
-            <a:rect l="0" t="0" r="r" b="b"/>
-            <a:pathLst>
-              <a:path w="254" h="1109">
-                <a:moveTo>
-                  <a:pt x="254" y="987"/>
-                </a:moveTo>
-                <a:lnTo>
-                  <a:pt x="0" y="1109"/>
-                </a:lnTo>
-                <a:lnTo>
-                  <a:pt x="0" y="119"/>
-                </a:lnTo>
-                <a:lnTo>
-                  <a:pt x="254" y="0"/>
-                </a:lnTo>
-                <a:lnTo>
-                  <a:pt x="254" y="987"/>
-                </a:lnTo>
-                <a:close/>
-              </a:path>
-            </a:pathLst>
-          </a:custGeom>
-          <a:solidFill>
-            <a:schemeClr val="accent1">
-              <a:lumMod val="75000"/>
-            </a:schemeClr>
-          </a:solidFill>
-          <a:ln>
-            <a:noFill/>
-          </a:ln>
-        </p:spPr>
-        <p:txBody>
-          <a:bodyPr vert="horz" wrap="square" lIns="91440" tIns="45720" rIns="91440" bIns="45720" numCol="1" anchor="t" anchorCtr="0" compatLnSpc="1">
-            <a:prstTxWarp prst="textNoShape">
-              <a:avLst/>
-            </a:prstTxWarp>
-          </a:bodyPr>
-          <a:lstStyle/>
-          <a:p>
-            <a:endParaRPr lang="en-US"/>
-          </a:p>
-        </p:txBody>
-      </p:sp>
-      <p:sp>
-        <p:nvSpPr>
-          <p:cNvPr id="14" name="Freeform 47">
-            <a:extLst>
-              <a:ext uri="{FF2B5EF4-FFF2-40B4-BE49-F238E27FC236}">
-                <a16:creationId xmlns:a16="http://schemas.microsoft.com/office/drawing/2014/main" id="{472E3A19-F5D5-48FC-BB9C-48C2F68F598B}"/>
-              </a:ext>
-              <a:ext uri="{C183D7F6-B498-43B3-948B-1728B52AA6E4}">
-                <adec:decorative xmlns:adec="http://schemas.microsoft.com/office/drawing/2017/decorative" val="1"/>
-              </a:ext>
-            </a:extLst>
-          </p:cNvPr>
-          <p:cNvSpPr>
-            <a:spLocks noGrp="1" noRot="1" noChangeAspect="1" noMove="1" noResize="1" noEditPoints="1" noAdjustHandles="1" noChangeArrowheads="1" noChangeShapeType="1" noTextEdit="1"/>
-          </p:cNvSpPr>
-          <p:nvPr>
-            <p:extLst>
-              <p:ext uri="{386F3935-93C4-4BCD-93E2-E3B085C9AB24}">
-                <p16:designElem xmlns:p16="http://schemas.microsoft.com/office/powerpoint/2015/main" val="1"/>
-              </p:ext>
-            </p:extLst>
-          </p:nvPr>
-        </p:nvSpPr>
-        <p:spPr bwMode="auto">
-          <a:xfrm>
-            <a:off x="644660" y="640894"/>
-            <a:ext cx="168275" cy="1713195"/>
-          </a:xfrm>
-          <a:custGeom>
-            <a:avLst/>
-            <a:gdLst>
-              <a:gd name="T0" fmla="*/ 106 w 106"/>
-              <a:gd name="T1" fmla="*/ 1114 h 1114"/>
-              <a:gd name="T2" fmla="*/ 0 w 106"/>
-              <a:gd name="T3" fmla="*/ 1005 h 1114"/>
-              <a:gd name="T4" fmla="*/ 0 w 106"/>
-              <a:gd name="T5" fmla="*/ 0 h 1114"/>
-              <a:gd name="T6" fmla="*/ 106 w 106"/>
-              <a:gd name="T7" fmla="*/ 110 h 1114"/>
-              <a:gd name="T8" fmla="*/ 106 w 106"/>
-              <a:gd name="T9" fmla="*/ 1114 h 1114"/>
-            </a:gdLst>
-            <a:ahLst/>
-            <a:cxnLst>
-              <a:cxn ang="0">
-                <a:pos x="T0" y="T1"/>
-              </a:cxn>
-              <a:cxn ang="0">
-                <a:pos x="T2" y="T3"/>
-              </a:cxn>
-              <a:cxn ang="0">
-                <a:pos x="T4" y="T5"/>
-              </a:cxn>
-              <a:cxn ang="0">
-                <a:pos x="T6" y="T7"/>
-              </a:cxn>
-              <a:cxn ang="0">
-                <a:pos x="T8" y="T9"/>
-              </a:cxn>
-            </a:cxnLst>
-            <a:rect l="0" t="0" r="r" b="b"/>
-            <a:pathLst>
-              <a:path w="106" h="1114">
-                <a:moveTo>
-                  <a:pt x="106" y="1114"/>
-                </a:moveTo>
-                <a:lnTo>
-                  <a:pt x="0" y="1005"/>
-                </a:lnTo>
-                <a:lnTo>
-                  <a:pt x="0" y="0"/>
-                </a:lnTo>
-                <a:lnTo>
-                  <a:pt x="106" y="110"/>
-                </a:lnTo>
-                <a:lnTo>
-                  <a:pt x="106" y="1114"/>
-                </a:lnTo>
-                <a:close/>
-              </a:path>
-            </a:pathLst>
-          </a:custGeom>
-          <a:solidFill>
-            <a:schemeClr val="accent1">
-              <a:lumMod val="50000"/>
-            </a:schemeClr>
-          </a:solidFill>
-          <a:ln>
-            <a:noFill/>
-          </a:ln>
-        </p:spPr>
-        <p:txBody>
-          <a:bodyPr vert="horz" wrap="square" lIns="91440" tIns="45720" rIns="91440" bIns="45720" numCol="1" anchor="t" anchorCtr="0" compatLnSpc="1">
-            <a:prstTxWarp prst="textNoShape">
-              <a:avLst/>
-            </a:prstTxWarp>
-          </a:bodyPr>
-          <a:lstStyle/>
-          <a:p>
-            <a:endParaRPr lang="en-US"/>
-          </a:p>
-        </p:txBody>
-      </p:sp>
-      <p:sp>
-        <p:nvSpPr>
-          <p:cNvPr id="16" name="Freeform 44">
-            <a:extLst>
-              <a:ext uri="{FF2B5EF4-FFF2-40B4-BE49-F238E27FC236}">
-                <a16:creationId xmlns:a16="http://schemas.microsoft.com/office/drawing/2014/main" id="{7A62E32F-BB65-43A8-8EB5-92346890E549}"/>
-              </a:ext>
-              <a:ext uri="{C183D7F6-B498-43B3-948B-1728B52AA6E4}">
-                <adec:decorative xmlns:adec="http://schemas.microsoft.com/office/drawing/2017/decorative" val="1"/>
-              </a:ext>
-            </a:extLst>
-          </p:cNvPr>
-          <p:cNvSpPr>
-            <a:spLocks noGrp="1" noRot="1" noChangeAspect="1" noMove="1" noResize="1" noEditPoints="1" noAdjustHandles="1" noChangeArrowheads="1" noChangeShapeType="1" noTextEdit="1"/>
-          </p:cNvSpPr>
-          <p:nvPr>
-            <p:extLst>
-              <p:ext uri="{386F3935-93C4-4BCD-93E2-E3B085C9AB24}">
-                <p16:designElem xmlns:p16="http://schemas.microsoft.com/office/powerpoint/2015/main" val="1"/>
-              </p:ext>
-            </p:extLst>
-          </p:nvPr>
-        </p:nvSpPr>
-        <p:spPr bwMode="auto">
-          <a:xfrm>
-            <a:off x="11223203" y="635716"/>
-            <a:ext cx="328612" cy="1742360"/>
-          </a:xfrm>
-          <a:custGeom>
-            <a:avLst/>
-            <a:gdLst>
-              <a:gd name="T0" fmla="*/ 207 w 207"/>
-              <a:gd name="T1" fmla="*/ 987 h 1114"/>
-              <a:gd name="T2" fmla="*/ 0 w 207"/>
-              <a:gd name="T3" fmla="*/ 1114 h 1114"/>
-              <a:gd name="T4" fmla="*/ 0 w 207"/>
-              <a:gd name="T5" fmla="*/ 127 h 1114"/>
-              <a:gd name="T6" fmla="*/ 207 w 207"/>
-              <a:gd name="T7" fmla="*/ 0 h 1114"/>
-              <a:gd name="T8" fmla="*/ 207 w 207"/>
-              <a:gd name="T9" fmla="*/ 987 h 1114"/>
-            </a:gdLst>
-            <a:ahLst/>
-            <a:cxnLst>
-              <a:cxn ang="0">
-                <a:pos x="T0" y="T1"/>
-              </a:cxn>
-              <a:cxn ang="0">
-                <a:pos x="T2" y="T3"/>
-              </a:cxn>
-              <a:cxn ang="0">
-                <a:pos x="T4" y="T5"/>
-              </a:cxn>
-              <a:cxn ang="0">
-                <a:pos x="T6" y="T7"/>
-              </a:cxn>
-              <a:cxn ang="0">
-                <a:pos x="T8" y="T9"/>
-              </a:cxn>
-            </a:cxnLst>
-            <a:rect l="0" t="0" r="r" b="b"/>
-            <a:pathLst>
-              <a:path w="207" h="1114">
-                <a:moveTo>
-                  <a:pt x="207" y="987"/>
-                </a:moveTo>
-                <a:lnTo>
-                  <a:pt x="0" y="1114"/>
-                </a:lnTo>
-                <a:lnTo>
-                  <a:pt x="0" y="127"/>
-                </a:lnTo>
-                <a:lnTo>
-                  <a:pt x="207" y="0"/>
-                </a:lnTo>
-                <a:lnTo>
-                  <a:pt x="207" y="987"/>
-                </a:lnTo>
-                <a:close/>
-              </a:path>
-            </a:pathLst>
-          </a:custGeom>
-          <a:solidFill>
-            <a:schemeClr val="accent1">
-              <a:lumMod val="50000"/>
-            </a:schemeClr>
-          </a:solidFill>
-          <a:ln>
-            <a:noFill/>
-          </a:ln>
-        </p:spPr>
-        <p:txBody>
-          <a:bodyPr vert="horz" wrap="square" lIns="91440" tIns="45720" rIns="91440" bIns="45720" numCol="1" anchor="t" anchorCtr="0" compatLnSpc="1">
-            <a:prstTxWarp prst="textNoShape">
-              <a:avLst/>
-            </a:prstTxWarp>
-          </a:bodyPr>
-          <a:lstStyle/>
-          <a:p>
-            <a:endParaRPr lang="en-US"/>
-          </a:p>
-        </p:txBody>
-      </p:sp>
-      <p:sp>
-        <p:nvSpPr>
-          <p:cNvPr id="18" name="Rectangle 17">
-            <a:extLst>
-              <a:ext uri="{FF2B5EF4-FFF2-40B4-BE49-F238E27FC236}">
-                <a16:creationId xmlns:a16="http://schemas.microsoft.com/office/drawing/2014/main" id="{14E91B64-9FCC-451E-AFB4-A827D6329367}"/>
-              </a:ext>
-              <a:ext uri="{C183D7F6-B498-43B3-948B-1728B52AA6E4}">
-                <adec:decorative xmlns:adec="http://schemas.microsoft.com/office/drawing/2017/decorative" val="1"/>
-              </a:ext>
-            </a:extLst>
-          </p:cNvPr>
-          <p:cNvSpPr>
-            <a:spLocks noGrp="1" noRot="1" noChangeAspect="1" noMove="1" noResize="1" noEditPoints="1" noAdjustHandles="1" noChangeArrowheads="1" noChangeShapeType="1" noTextEdit="1"/>
-          </p:cNvSpPr>
-          <p:nvPr>
-            <p:extLst>
-              <p:ext uri="{386F3935-93C4-4BCD-93E2-E3B085C9AB24}">
-                <p16:designElem xmlns:p16="http://schemas.microsoft.com/office/powerpoint/2015/main" val="1"/>
-              </p:ext>
-            </p:extLst>
-          </p:nvPr>
-        </p:nvSpPr>
-        <p:spPr bwMode="auto">
-          <a:xfrm>
-            <a:off x="644055" y="635715"/>
-            <a:ext cx="10907863" cy="1541457"/>
-          </a:xfrm>
-          <a:prstGeom prst="rect">
-            <a:avLst/>
-          </a:prstGeom>
-          <a:solidFill>
-            <a:schemeClr val="accent1"/>
-          </a:solidFill>
-          <a:ln>
-            <a:noFill/>
-          </a:ln>
-        </p:spPr>
-        <p:txBody>
-          <a:bodyPr vert="horz" wrap="square" lIns="91440" tIns="45720" rIns="91440" bIns="45720" numCol="1" anchor="t" anchorCtr="0" compatLnSpc="1">
-            <a:prstTxWarp prst="textNoShape">
-              <a:avLst/>
-            </a:prstTxWarp>
-          </a:bodyPr>
-          <a:lstStyle/>
-          <a:p>
-            <a:endParaRPr lang="en-US"/>
-          </a:p>
-        </p:txBody>
-      </p:sp>
-      <p:sp>
-        <p:nvSpPr>
-          <p:cNvPr id="2" name="Titre 1">
-            <a:extLst>
-              <a:ext uri="{FF2B5EF4-FFF2-40B4-BE49-F238E27FC236}">
-                <a16:creationId xmlns:a16="http://schemas.microsoft.com/office/drawing/2014/main" id="{787733BC-219D-49C7-B5B4-F7CD9774C6A4}"/>
-              </a:ext>
-            </a:extLst>
-          </p:cNvPr>
-          <p:cNvSpPr>
-            <a:spLocks noGrp="1"/>
-          </p:cNvSpPr>
-          <p:nvPr>
-            <p:ph type="title"/>
-          </p:nvPr>
-        </p:nvSpPr>
-        <p:spPr>
-          <a:xfrm>
-            <a:off x="958506" y="800392"/>
-            <a:ext cx="10264697" cy="1212102"/>
-          </a:xfrm>
-        </p:spPr>
-        <p:txBody>
-          <a:bodyPr>
-            <a:normAutofit/>
-          </a:bodyPr>
-          <a:lstStyle/>
-          <a:p>
-            <a:r>
-              <a:rPr lang="fr-FR" sz="4000" dirty="0">
-                <a:solidFill>
-                  <a:srgbClr val="FFFFFF"/>
-                </a:solidFill>
-              </a:rPr>
-              <a:t>CSS</a:t>
-            </a:r>
-          </a:p>
-        </p:txBody>
-      </p:sp>
-      <p:sp>
-        <p:nvSpPr>
-          <p:cNvPr id="9" name="Espace réservé du numéro de diapositive 8">
-            <a:extLst>
-              <a:ext uri="{FF2B5EF4-FFF2-40B4-BE49-F238E27FC236}">
-                <a16:creationId xmlns:a16="http://schemas.microsoft.com/office/drawing/2014/main" id="{F3EDF272-70D0-418F-B1E4-090F125EAE69}"/>
-              </a:ext>
-            </a:extLst>
-          </p:cNvPr>
-          <p:cNvSpPr>
-            <a:spLocks noGrp="1"/>
-          </p:cNvSpPr>
-          <p:nvPr>
-            <p:ph type="sldNum" sz="quarter" idx="12"/>
-          </p:nvPr>
-        </p:nvSpPr>
-        <p:spPr/>
-        <p:txBody>
-          <a:bodyPr/>
-          <a:lstStyle/>
-          <a:p>
-            <a:fld id="{F8323CC4-5E62-4ADB-BC7C-89B23C89378E}" type="slidenum">
-              <a:rPr lang="fr-FR" smtClean="0"/>
-              <a:t>25</a:t>
-            </a:fld>
-            <a:endParaRPr lang="fr-FR"/>
-          </a:p>
-        </p:txBody>
-      </p:sp>
-      <p:pic>
-        <p:nvPicPr>
-          <p:cNvPr id="21" name="Image 20">
-            <a:extLst>
-              <a:ext uri="{FF2B5EF4-FFF2-40B4-BE49-F238E27FC236}">
-                <a16:creationId xmlns:a16="http://schemas.microsoft.com/office/drawing/2014/main" id="{8CEC669A-BF11-492F-8D9B-8C642E5E0AEB}"/>
-              </a:ext>
-            </a:extLst>
-          </p:cNvPr>
-          <p:cNvPicPr>
-            <a:picLocks noChangeAspect="1"/>
-          </p:cNvPicPr>
-          <p:nvPr/>
         </p:nvPicPr>
         <p:blipFill>
-          <a:blip r:embed="rId2"/>
+          <a:blip r:embed="rId2">
+            <a:extLst>
+              <a:ext uri="{28A0092B-C50C-407E-A947-70E740481C1C}">
+                <a14:useLocalDpi xmlns:a14="http://schemas.microsoft.com/office/drawing/2010/main" val="0"/>
+              </a:ext>
+            </a:extLst>
+          </a:blip>
           <a:stretch>
             <a:fillRect/>
           </a:stretch>
         </p:blipFill>
         <p:spPr>
           <a:xfrm>
-            <a:off x="5568217" y="3365651"/>
-            <a:ext cx="5202525" cy="688454"/>
+            <a:off x="0" y="0"/>
+            <a:ext cx="12192000" cy="6858000"/>
           </a:xfrm>
           <a:prstGeom prst="rect">
             <a:avLst/>
           </a:prstGeom>
         </p:spPr>
       </p:pic>
-      <p:pic>
-        <p:nvPicPr>
-          <p:cNvPr id="23" name="Image 22">
-            <a:extLst>
-              <a:ext uri="{FF2B5EF4-FFF2-40B4-BE49-F238E27FC236}">
-                <a16:creationId xmlns:a16="http://schemas.microsoft.com/office/drawing/2014/main" id="{50C13BC9-0314-44AB-98D6-4BDC993F1188}"/>
-              </a:ext>
-            </a:extLst>
-          </p:cNvPr>
-          <p:cNvPicPr>
-            <a:picLocks noChangeAspect="1"/>
-          </p:cNvPicPr>
+      <p:sp>
+        <p:nvSpPr>
+          <p:cNvPr id="2" name="Titre 1">
+            <a:extLst>
+              <a:ext uri="{FF2B5EF4-FFF2-40B4-BE49-F238E27FC236}">
+                <a16:creationId xmlns:a16="http://schemas.microsoft.com/office/drawing/2014/main" id="{AEF9E91C-9F1A-4BEE-A693-D76078DE9F48}"/>
+              </a:ext>
+            </a:extLst>
+          </p:cNvPr>
+          <p:cNvSpPr>
+            <a:spLocks noGrp="1"/>
+          </p:cNvSpPr>
+          <p:nvPr>
+            <p:ph type="title"/>
+          </p:nvPr>
+        </p:nvSpPr>
+        <p:spPr>
+          <a:xfrm>
+            <a:off x="3045368" y="2043663"/>
+            <a:ext cx="6105194" cy="2031055"/>
+          </a:xfrm>
+        </p:spPr>
+        <p:txBody>
+          <a:bodyPr vert="horz" lIns="91440" tIns="45720" rIns="91440" bIns="45720" rtlCol="0" anchor="b">
+            <a:normAutofit/>
+          </a:bodyPr>
+          <a:lstStyle/>
+          <a:p>
+            <a:pPr algn="ctr"/>
+            <a:r>
+              <a:rPr lang="en-US" sz="6000" kern="1200">
+                <a:solidFill>
+                  <a:srgbClr val="FFFFFF"/>
+                </a:solidFill>
+                <a:latin typeface="+mj-lt"/>
+                <a:ea typeface="+mj-ea"/>
+                <a:cs typeface="+mj-cs"/>
+              </a:rPr>
+              <a:t>Exercice 7 – Mise en forme </a:t>
+            </a:r>
+          </a:p>
+        </p:txBody>
+      </p:sp>
+      <p:sp>
+        <p:nvSpPr>
+          <p:cNvPr id="4" name="Espace réservé du numéro de diapositive 3">
+            <a:extLst>
+              <a:ext uri="{FF2B5EF4-FFF2-40B4-BE49-F238E27FC236}">
+                <a16:creationId xmlns:a16="http://schemas.microsoft.com/office/drawing/2014/main" id="{74F3023A-B7CB-4C5A-A04F-98974204E143}"/>
+              </a:ext>
+            </a:extLst>
+          </p:cNvPr>
+          <p:cNvSpPr>
+            <a:spLocks noGrp="1"/>
+          </p:cNvSpPr>
+          <p:nvPr>
+            <p:ph type="sldNum" sz="quarter" idx="12"/>
+          </p:nvPr>
+        </p:nvSpPr>
+        <p:spPr>
+          <a:xfrm>
+            <a:off x="10825930" y="6223702"/>
+            <a:ext cx="570728" cy="314067"/>
+          </a:xfrm>
+        </p:spPr>
+        <p:txBody>
+          <a:bodyPr vert="horz" lIns="91440" tIns="45720" rIns="91440" bIns="45720" rtlCol="0" anchor="ctr">
+            <a:normAutofit/>
+          </a:bodyPr>
+          <a:lstStyle/>
+          <a:p>
+            <a:pPr>
+              <a:spcAft>
+                <a:spcPts val="600"/>
+              </a:spcAft>
+            </a:pPr>
+            <a:fld id="{F8323CC4-5E62-4ADB-BC7C-89B23C89378E}" type="slidenum">
+              <a:rPr lang="en-US" sz="1000">
+                <a:solidFill>
+                  <a:srgbClr val="898989"/>
+                </a:solidFill>
+              </a:rPr>
+              <a:pPr>
+                <a:spcAft>
+                  <a:spcPts val="600"/>
+                </a:spcAft>
+              </a:pPr>
+              <a:t>25</a:t>
+            </a:fld>
+            <a:endParaRPr lang="en-US" sz="1000">
+              <a:solidFill>
+                <a:srgbClr val="898989"/>
+              </a:solidFill>
+            </a:endParaRPr>
+          </a:p>
+        </p:txBody>
+      </p:sp>
+      <p:sp>
+        <p:nvSpPr>
+          <p:cNvPr id="6" name="Rectangle 5">
+            <a:extLst>
+              <a:ext uri="{FF2B5EF4-FFF2-40B4-BE49-F238E27FC236}">
+                <a16:creationId xmlns:a16="http://schemas.microsoft.com/office/drawing/2014/main" id="{AD28A3D1-D9BD-4A35-A7B7-348F2F564EF3}"/>
+              </a:ext>
+            </a:extLst>
+          </p:cNvPr>
+          <p:cNvSpPr/>
           <p:nvPr/>
-        </p:nvPicPr>
-        <p:blipFill>
-          <a:blip r:embed="rId3"/>
-          <a:stretch>
-            <a:fillRect/>
-          </a:stretch>
-        </p:blipFill>
+        </p:nvSpPr>
         <p:spPr>
           <a:xfrm>
-            <a:off x="1421258" y="2861300"/>
-            <a:ext cx="3629532" cy="1819529"/>
+            <a:off x="3045368" y="4493623"/>
+            <a:ext cx="6322422" cy="1123406"/>
           </a:xfrm>
           <a:prstGeom prst="rect">
             <a:avLst/>
           </a:prstGeom>
-        </p:spPr>
-      </p:pic>
-      <p:pic>
-        <p:nvPicPr>
-          <p:cNvPr id="31" name="Image 30">
-            <a:extLst>
-              <a:ext uri="{FF2B5EF4-FFF2-40B4-BE49-F238E27FC236}">
-                <a16:creationId xmlns:a16="http://schemas.microsoft.com/office/drawing/2014/main" id="{1C7C9B1E-D2A0-4210-A1AD-75FDC0835E1D}"/>
-              </a:ext>
-            </a:extLst>
-          </p:cNvPr>
-          <p:cNvPicPr>
-            <a:picLocks noChangeAspect="1"/>
-          </p:cNvPicPr>
-          <p:nvPr/>
-        </p:nvPicPr>
-        <p:blipFill>
-          <a:blip r:embed="rId4"/>
-          <a:stretch>
-            <a:fillRect/>
-          </a:stretch>
-        </p:blipFill>
-        <p:spPr>
-          <a:xfrm>
-            <a:off x="3800815" y="5324080"/>
-            <a:ext cx="3896269" cy="1467055"/>
-          </a:xfrm>
-          <a:prstGeom prst="rect">
-            <a:avLst/>
-          </a:prstGeom>
-        </p:spPr>
-      </p:pic>
-      <p:sp>
-        <p:nvSpPr>
-          <p:cNvPr id="32" name="Rectangle 31">
-            <a:extLst>
-              <a:ext uri="{FF2B5EF4-FFF2-40B4-BE49-F238E27FC236}">
-                <a16:creationId xmlns:a16="http://schemas.microsoft.com/office/drawing/2014/main" id="{852BC564-0775-47C9-8CB6-66816AA21E8E}"/>
-              </a:ext>
-            </a:extLst>
-          </p:cNvPr>
-          <p:cNvSpPr/>
-          <p:nvPr/>
-        </p:nvSpPr>
-        <p:spPr>
-          <a:xfrm>
-            <a:off x="5748950" y="3365651"/>
-            <a:ext cx="1231272" cy="226593"/>
-          </a:xfrm>
-          <a:prstGeom prst="rect">
-            <a:avLst/>
-          </a:prstGeom>
-          <a:noFill/>
-          <a:ln>
-            <a:solidFill>
-              <a:srgbClr val="FF0000"/>
-            </a:solidFill>
-          </a:ln>
+          <a:solidFill>
+            <a:schemeClr val="tx2">
+              <a:lumMod val="40000"/>
+              <a:lumOff val="60000"/>
+            </a:schemeClr>
+          </a:solidFill>
         </p:spPr>
         <p:style>
           <a:lnRef idx="2">
@@ -14555,239 +14422,21 @@
           <a:lstStyle/>
           <a:p>
             <a:pPr algn="ctr"/>
-            <a:endParaRPr lang="fr-FR"/>
-          </a:p>
-        </p:txBody>
-      </p:sp>
-      <p:sp>
-        <p:nvSpPr>
-          <p:cNvPr id="33" name="Rectangle 32">
-            <a:extLst>
-              <a:ext uri="{FF2B5EF4-FFF2-40B4-BE49-F238E27FC236}">
-                <a16:creationId xmlns:a16="http://schemas.microsoft.com/office/drawing/2014/main" id="{D3AA3FBE-B1AA-4904-A3AF-8F74B235A7CA}"/>
-              </a:ext>
-            </a:extLst>
-          </p:cNvPr>
-          <p:cNvSpPr/>
-          <p:nvPr/>
-        </p:nvSpPr>
-        <p:spPr>
-          <a:xfrm>
-            <a:off x="8321879" y="3771064"/>
-            <a:ext cx="654341" cy="251116"/>
-          </a:xfrm>
-          <a:prstGeom prst="rect">
-            <a:avLst/>
-          </a:prstGeom>
-          <a:noFill/>
-          <a:ln>
-            <a:solidFill>
-              <a:srgbClr val="FF0000"/>
-            </a:solidFill>
-          </a:ln>
-        </p:spPr>
-        <p:style>
-          <a:lnRef idx="2">
-            <a:schemeClr val="accent1">
-              <a:shade val="50000"/>
-            </a:schemeClr>
-          </a:lnRef>
-          <a:fillRef idx="1">
-            <a:schemeClr val="accent1"/>
-          </a:fillRef>
-          <a:effectRef idx="0">
-            <a:schemeClr val="accent1"/>
-          </a:effectRef>
-          <a:fontRef idx="minor">
-            <a:schemeClr val="lt1"/>
-          </a:fontRef>
-        </p:style>
-        <p:txBody>
-          <a:bodyPr rtlCol="0" anchor="ctr"/>
-          <a:lstStyle/>
-          <a:p>
-            <a:pPr algn="ctr"/>
-            <a:endParaRPr lang="fr-FR"/>
-          </a:p>
-        </p:txBody>
-      </p:sp>
-      <p:sp>
-        <p:nvSpPr>
-          <p:cNvPr id="34" name="ZoneTexte 33">
-            <a:extLst>
-              <a:ext uri="{FF2B5EF4-FFF2-40B4-BE49-F238E27FC236}">
-                <a16:creationId xmlns:a16="http://schemas.microsoft.com/office/drawing/2014/main" id="{D4FB9192-878B-450C-972F-C55F72F87901}"/>
-              </a:ext>
-            </a:extLst>
-          </p:cNvPr>
-          <p:cNvSpPr txBox="1"/>
-          <p:nvPr/>
-        </p:nvSpPr>
-        <p:spPr>
-          <a:xfrm>
-            <a:off x="1421258" y="2265028"/>
-            <a:ext cx="5365436" cy="461665"/>
-          </a:xfrm>
-          <a:prstGeom prst="rect">
-            <a:avLst/>
-          </a:prstGeom>
-          <a:noFill/>
-        </p:spPr>
-        <p:txBody>
-          <a:bodyPr wrap="square" rtlCol="0">
-            <a:spAutoFit/>
-          </a:bodyPr>
-          <a:lstStyle/>
-          <a:p>
-            <a:pPr marL="285750" indent="-285750">
-              <a:buFont typeface="Arial" panose="020B0604020202020204" pitchFamily="34" charset="0"/>
-              <a:buChar char="•"/>
-            </a:pPr>
             <a:r>
-              <a:rPr lang="fr-FR" sz="2400" dirty="0"/>
-              <a:t>Utilisation de classes et </a:t>
+              <a:rPr lang="fr-FR" dirty="0">
+                <a:solidFill>
+                  <a:schemeClr val="tx1"/>
+                </a:solidFill>
+              </a:rPr>
+              <a:t>Utilisez du CSS afin de différencier les professeurs et les étudiants</a:t>
             </a:r>
-            <a:r>
-              <a:rPr lang="fr-FR" sz="2400" dirty="0" err="1"/>
-              <a:t>d’id</a:t>
-            </a:r>
-            <a:endParaRPr lang="fr-FR" sz="2400" dirty="0"/>
-          </a:p>
-        </p:txBody>
-      </p:sp>
-      <p:cxnSp>
-        <p:nvCxnSpPr>
-          <p:cNvPr id="36" name="Connecteur droit avec flèche 35">
-            <a:extLst>
-              <a:ext uri="{FF2B5EF4-FFF2-40B4-BE49-F238E27FC236}">
-                <a16:creationId xmlns:a16="http://schemas.microsoft.com/office/drawing/2014/main" id="{130A4C7B-5C03-4BE2-B023-4FC500AC7228}"/>
-              </a:ext>
-            </a:extLst>
-          </p:cNvPr>
-          <p:cNvCxnSpPr/>
-          <p:nvPr/>
-        </p:nvCxnSpPr>
-        <p:spPr>
-          <a:xfrm>
-            <a:off x="2667699" y="2986481"/>
-            <a:ext cx="3081251" cy="379170"/>
-          </a:xfrm>
-          <a:prstGeom prst="straightConnector1">
-            <a:avLst/>
-          </a:prstGeom>
-          <a:ln>
-            <a:solidFill>
-              <a:srgbClr val="FF0000"/>
-            </a:solidFill>
-            <a:tailEnd type="triangle"/>
-          </a:ln>
-        </p:spPr>
-        <p:style>
-          <a:lnRef idx="1">
-            <a:schemeClr val="accent1"/>
-          </a:lnRef>
-          <a:fillRef idx="0">
-            <a:schemeClr val="accent1"/>
-          </a:fillRef>
-          <a:effectRef idx="0">
-            <a:schemeClr val="accent1"/>
-          </a:effectRef>
-          <a:fontRef idx="minor">
-            <a:schemeClr val="tx1"/>
-          </a:fontRef>
-        </p:style>
-      </p:cxnSp>
-      <p:cxnSp>
-        <p:nvCxnSpPr>
-          <p:cNvPr id="38" name="Connecteur droit 37">
-            <a:extLst>
-              <a:ext uri="{FF2B5EF4-FFF2-40B4-BE49-F238E27FC236}">
-                <a16:creationId xmlns:a16="http://schemas.microsoft.com/office/drawing/2014/main" id="{B5FF939F-C3C5-4602-9D1D-79A5A25CEC17}"/>
-              </a:ext>
-            </a:extLst>
-          </p:cNvPr>
-          <p:cNvCxnSpPr>
-            <a:cxnSpLocks/>
-          </p:cNvCxnSpPr>
-          <p:nvPr/>
-        </p:nvCxnSpPr>
-        <p:spPr>
-          <a:xfrm>
-            <a:off x="2013358" y="3917659"/>
-            <a:ext cx="6597242" cy="429936"/>
-          </a:xfrm>
-          <a:prstGeom prst="line">
-            <a:avLst/>
-          </a:prstGeom>
-          <a:ln>
-            <a:solidFill>
-              <a:srgbClr val="FF0000"/>
-            </a:solidFill>
-          </a:ln>
-        </p:spPr>
-        <p:style>
-          <a:lnRef idx="1">
-            <a:schemeClr val="accent1"/>
-          </a:lnRef>
-          <a:fillRef idx="0">
-            <a:schemeClr val="accent1"/>
-          </a:fillRef>
-          <a:effectRef idx="0">
-            <a:schemeClr val="accent1"/>
-          </a:effectRef>
-          <a:fontRef idx="minor">
-            <a:schemeClr val="tx1"/>
-          </a:fontRef>
-        </p:style>
-      </p:cxnSp>
-      <p:cxnSp>
-        <p:nvCxnSpPr>
-          <p:cNvPr id="40" name="Connecteur droit avec flèche 39">
-            <a:extLst>
-              <a:ext uri="{FF2B5EF4-FFF2-40B4-BE49-F238E27FC236}">
-                <a16:creationId xmlns:a16="http://schemas.microsoft.com/office/drawing/2014/main" id="{012D1319-1421-4481-ACD6-6A25F32C320F}"/>
-              </a:ext>
-            </a:extLst>
-          </p:cNvPr>
-          <p:cNvCxnSpPr>
-            <a:cxnSpLocks/>
-          </p:cNvCxnSpPr>
-          <p:nvPr/>
-        </p:nvCxnSpPr>
-        <p:spPr>
-          <a:xfrm flipV="1">
-            <a:off x="8610600" y="4022181"/>
-            <a:ext cx="0" cy="325414"/>
-          </a:xfrm>
-          <a:prstGeom prst="straightConnector1">
-            <a:avLst/>
-          </a:prstGeom>
-          <a:ln>
-            <a:solidFill>
-              <a:srgbClr val="FF0000"/>
-            </a:solidFill>
-            <a:tailEnd type="triangle"/>
-          </a:ln>
-        </p:spPr>
-        <p:style>
-          <a:lnRef idx="1">
-            <a:schemeClr val="accent1"/>
-          </a:lnRef>
-          <a:fillRef idx="0">
-            <a:schemeClr val="accent1"/>
-          </a:fillRef>
-          <a:effectRef idx="0">
-            <a:schemeClr val="accent1"/>
-          </a:effectRef>
-          <a:fontRef idx="minor">
-            <a:schemeClr val="tx1"/>
-          </a:fontRef>
-        </p:style>
-      </p:cxnSp>
+          </a:p>
+        </p:txBody>
+      </p:sp>
     </p:spTree>
     <p:extLst>
       <p:ext uri="{BB962C8B-B14F-4D97-AF65-F5344CB8AC3E}">
-        <p14:creationId xmlns:p14="http://schemas.microsoft.com/office/powerpoint/2010/main" val="3567119921"/>
+        <p14:creationId xmlns:p14="http://schemas.microsoft.com/office/powerpoint/2010/main" val="2800563334"/>
       </p:ext>
     </p:extLst>
   </p:cSld>
@@ -14822,12 +14471,12 @@
           <a:chExt cx="0" cy="0"/>
         </a:xfrm>
       </p:grpSpPr>
-      <p:sp>
-        <p:nvSpPr>
-          <p:cNvPr id="9" name="Rectangle 8">
-            <a:extLst>
-              <a:ext uri="{FF2B5EF4-FFF2-40B4-BE49-F238E27FC236}">
-                <a16:creationId xmlns:a16="http://schemas.microsoft.com/office/drawing/2014/main" id="{23962611-DFD5-4092-AAFD-559E3DFCE2C9}"/>
+      <p:sp useBgFill="1">
+        <p:nvSpPr>
+          <p:cNvPr id="8" name="Rectangle 7">
+            <a:extLst>
+              <a:ext uri="{FF2B5EF4-FFF2-40B4-BE49-F238E27FC236}">
+                <a16:creationId xmlns:a16="http://schemas.microsoft.com/office/drawing/2014/main" id="{827B839B-9ADE-406B-8590-F1CAEDED45A1}"/>
               </a:ext>
               <a:ext uri="{C183D7F6-B498-43B3-948B-1728B52AA6E4}">
                 <adec:decorative xmlns:adec="http://schemas.microsoft.com/office/drawing/2017/decorative" val="1"/>
@@ -14847,37 +14496,12 @@
         </p:nvSpPr>
         <p:spPr>
           <a:xfrm>
-            <a:off x="475488" y="0"/>
-            <a:ext cx="10910292" cy="6858000"/>
+            <a:off x="0" y="0"/>
+            <a:ext cx="12188952" cy="6858000"/>
           </a:xfrm>
           <a:prstGeom prst="rect">
             <a:avLst/>
           </a:prstGeom>
-          <a:gradFill>
-            <a:gsLst>
-              <a:gs pos="0">
-                <a:schemeClr val="accent1">
-                  <a:lumMod val="90000"/>
-                </a:schemeClr>
-              </a:gs>
-              <a:gs pos="25000">
-                <a:schemeClr val="accent1">
-                  <a:lumMod val="90000"/>
-                </a:schemeClr>
-              </a:gs>
-              <a:gs pos="94000">
-                <a:schemeClr val="bg2">
-                  <a:lumMod val="25000"/>
-                </a:schemeClr>
-              </a:gs>
-              <a:gs pos="100000">
-                <a:schemeClr val="bg2">
-                  <a:lumMod val="25000"/>
-                </a:schemeClr>
-              </a:gs>
-            </a:gsLst>
-            <a:lin ang="4200000" scaled="0"/>
-          </a:gradFill>
           <a:ln>
             <a:noFill/>
           </a:ln>
@@ -14907,21 +14531,21 @@
           </a:p>
         </p:txBody>
       </p:sp>
-      <p:pic>
-        <p:nvPicPr>
-          <p:cNvPr id="11" name="Picture 10">
-            <a:extLst>
-              <a:ext uri="{FF2B5EF4-FFF2-40B4-BE49-F238E27FC236}">
-                <a16:creationId xmlns:a16="http://schemas.microsoft.com/office/drawing/2014/main" id="{2270F1FA-0425-408F-9861-80BF5AFB276D}"/>
+      <p:sp>
+        <p:nvSpPr>
+          <p:cNvPr id="10" name="Freeform 45">
+            <a:extLst>
+              <a:ext uri="{FF2B5EF4-FFF2-40B4-BE49-F238E27FC236}">
+                <a16:creationId xmlns:a16="http://schemas.microsoft.com/office/drawing/2014/main" id="{CFE45BF0-46DB-408C-B5F7-7B11716805D4}"/>
               </a:ext>
               <a:ext uri="{C183D7F6-B498-43B3-948B-1728B52AA6E4}">
                 <adec:decorative xmlns:adec="http://schemas.microsoft.com/office/drawing/2017/decorative" val="1"/>
               </a:ext>
             </a:extLst>
           </p:cNvPr>
-          <p:cNvPicPr>
-            <a:picLocks noGrp="1" noRot="1" noChangeAspect="1" noMove="1" noResize="1" noEditPoints="1" noAdjustHandles="1" noChangeArrowheads="1" noChangeShapeType="1" noCrop="1"/>
-          </p:cNvPicPr>
+          <p:cNvSpPr>
+            <a:spLocks noGrp="1" noRot="1" noChangeAspect="1" noMove="1" noResize="1" noEditPoints="1" noAdjustHandles="1" noChangeArrowheads="1" noChangeShapeType="1" noTextEdit="1"/>
+          </p:cNvSpPr>
           <p:nvPr>
             <p:extLst>
               <p:ext uri="{386F3935-93C4-4BCD-93E2-E3B085C9AB24}">
@@ -14929,23 +14553,538 @@
               </p:ext>
             </p:extLst>
           </p:nvPr>
+        </p:nvSpPr>
+        <p:spPr bwMode="auto">
+          <a:xfrm>
+            <a:off x="409710" y="1022350"/>
+            <a:ext cx="709612" cy="2095501"/>
+          </a:xfrm>
+          <a:custGeom>
+            <a:avLst/>
+            <a:gdLst>
+              <a:gd name="T0" fmla="*/ 447 w 447"/>
+              <a:gd name="T1" fmla="*/ 1363 h 1363"/>
+              <a:gd name="T2" fmla="*/ 0 w 447"/>
+              <a:gd name="T3" fmla="*/ 987 h 1363"/>
+              <a:gd name="T4" fmla="*/ 0 w 447"/>
+              <a:gd name="T5" fmla="*/ 0 h 1363"/>
+              <a:gd name="T6" fmla="*/ 447 w 447"/>
+              <a:gd name="T7" fmla="*/ 376 h 1363"/>
+              <a:gd name="T8" fmla="*/ 447 w 447"/>
+              <a:gd name="T9" fmla="*/ 1363 h 1363"/>
+            </a:gdLst>
+            <a:ahLst/>
+            <a:cxnLst>
+              <a:cxn ang="0">
+                <a:pos x="T0" y="T1"/>
+              </a:cxn>
+              <a:cxn ang="0">
+                <a:pos x="T2" y="T3"/>
+              </a:cxn>
+              <a:cxn ang="0">
+                <a:pos x="T4" y="T5"/>
+              </a:cxn>
+              <a:cxn ang="0">
+                <a:pos x="T6" y="T7"/>
+              </a:cxn>
+              <a:cxn ang="0">
+                <a:pos x="T8" y="T9"/>
+              </a:cxn>
+            </a:cxnLst>
+            <a:rect l="0" t="0" r="r" b="b"/>
+            <a:pathLst>
+              <a:path w="447" h="1363">
+                <a:moveTo>
+                  <a:pt x="447" y="1363"/>
+                </a:moveTo>
+                <a:lnTo>
+                  <a:pt x="0" y="987"/>
+                </a:lnTo>
+                <a:lnTo>
+                  <a:pt x="0" y="0"/>
+                </a:lnTo>
+                <a:lnTo>
+                  <a:pt x="447" y="376"/>
+                </a:lnTo>
+                <a:lnTo>
+                  <a:pt x="447" y="1363"/>
+                </a:lnTo>
+                <a:close/>
+              </a:path>
+            </a:pathLst>
+          </a:custGeom>
+          <a:solidFill>
+            <a:schemeClr val="accent1">
+              <a:lumMod val="50000"/>
+            </a:schemeClr>
+          </a:solidFill>
+          <a:ln>
+            <a:noFill/>
+          </a:ln>
+        </p:spPr>
+        <p:txBody>
+          <a:bodyPr vert="horz" wrap="square" lIns="91440" tIns="45720" rIns="91440" bIns="45720" numCol="1" anchor="t" anchorCtr="0" compatLnSpc="1">
+            <a:prstTxWarp prst="textNoShape">
+              <a:avLst/>
+            </a:prstTxWarp>
+          </a:bodyPr>
+          <a:lstStyle/>
+          <a:p>
+            <a:endParaRPr lang="en-US"/>
+          </a:p>
+        </p:txBody>
+      </p:sp>
+      <p:sp>
+        <p:nvSpPr>
+          <p:cNvPr id="12" name="Freeform 46">
+            <a:extLst>
+              <a:ext uri="{FF2B5EF4-FFF2-40B4-BE49-F238E27FC236}">
+                <a16:creationId xmlns:a16="http://schemas.microsoft.com/office/drawing/2014/main" id="{2AEBC8F2-97B1-41B4-93F1-2D289E197FBA}"/>
+              </a:ext>
+              <a:ext uri="{C183D7F6-B498-43B3-948B-1728B52AA6E4}">
+                <adec:decorative xmlns:adec="http://schemas.microsoft.com/office/drawing/2017/decorative" val="1"/>
+              </a:ext>
+            </a:extLst>
+          </p:cNvPr>
+          <p:cNvSpPr>
+            <a:spLocks noGrp="1" noRot="1" noChangeAspect="1" noMove="1" noResize="1" noEditPoints="1" noAdjustHandles="1" noChangeArrowheads="1" noChangeShapeType="1" noTextEdit="1"/>
+          </p:cNvSpPr>
+          <p:nvPr>
+            <p:extLst>
+              <p:ext uri="{386F3935-93C4-4BCD-93E2-E3B085C9AB24}">
+                <p16:designElem xmlns:p16="http://schemas.microsoft.com/office/powerpoint/2015/main" val="1"/>
+              </p:ext>
+            </p:extLst>
+          </p:nvPr>
+        </p:nvSpPr>
+        <p:spPr bwMode="auto">
+          <a:xfrm>
+            <a:off x="409710" y="837744"/>
+            <a:ext cx="403225" cy="1705431"/>
+          </a:xfrm>
+          <a:custGeom>
+            <a:avLst/>
+            <a:gdLst>
+              <a:gd name="T0" fmla="*/ 254 w 254"/>
+              <a:gd name="T1" fmla="*/ 987 h 1109"/>
+              <a:gd name="T2" fmla="*/ 0 w 254"/>
+              <a:gd name="T3" fmla="*/ 1109 h 1109"/>
+              <a:gd name="T4" fmla="*/ 0 w 254"/>
+              <a:gd name="T5" fmla="*/ 119 h 1109"/>
+              <a:gd name="T6" fmla="*/ 254 w 254"/>
+              <a:gd name="T7" fmla="*/ 0 h 1109"/>
+              <a:gd name="T8" fmla="*/ 254 w 254"/>
+              <a:gd name="T9" fmla="*/ 987 h 1109"/>
+            </a:gdLst>
+            <a:ahLst/>
+            <a:cxnLst>
+              <a:cxn ang="0">
+                <a:pos x="T0" y="T1"/>
+              </a:cxn>
+              <a:cxn ang="0">
+                <a:pos x="T2" y="T3"/>
+              </a:cxn>
+              <a:cxn ang="0">
+                <a:pos x="T4" y="T5"/>
+              </a:cxn>
+              <a:cxn ang="0">
+                <a:pos x="T6" y="T7"/>
+              </a:cxn>
+              <a:cxn ang="0">
+                <a:pos x="T8" y="T9"/>
+              </a:cxn>
+            </a:cxnLst>
+            <a:rect l="0" t="0" r="r" b="b"/>
+            <a:pathLst>
+              <a:path w="254" h="1109">
+                <a:moveTo>
+                  <a:pt x="254" y="987"/>
+                </a:moveTo>
+                <a:lnTo>
+                  <a:pt x="0" y="1109"/>
+                </a:lnTo>
+                <a:lnTo>
+                  <a:pt x="0" y="119"/>
+                </a:lnTo>
+                <a:lnTo>
+                  <a:pt x="254" y="0"/>
+                </a:lnTo>
+                <a:lnTo>
+                  <a:pt x="254" y="987"/>
+                </a:lnTo>
+                <a:close/>
+              </a:path>
+            </a:pathLst>
+          </a:custGeom>
+          <a:solidFill>
+            <a:schemeClr val="accent1">
+              <a:lumMod val="75000"/>
+            </a:schemeClr>
+          </a:solidFill>
+          <a:ln>
+            <a:noFill/>
+          </a:ln>
+        </p:spPr>
+        <p:txBody>
+          <a:bodyPr vert="horz" wrap="square" lIns="91440" tIns="45720" rIns="91440" bIns="45720" numCol="1" anchor="t" anchorCtr="0" compatLnSpc="1">
+            <a:prstTxWarp prst="textNoShape">
+              <a:avLst/>
+            </a:prstTxWarp>
+          </a:bodyPr>
+          <a:lstStyle/>
+          <a:p>
+            <a:endParaRPr lang="en-US"/>
+          </a:p>
+        </p:txBody>
+      </p:sp>
+      <p:sp>
+        <p:nvSpPr>
+          <p:cNvPr id="14" name="Freeform 47">
+            <a:extLst>
+              <a:ext uri="{FF2B5EF4-FFF2-40B4-BE49-F238E27FC236}">
+                <a16:creationId xmlns:a16="http://schemas.microsoft.com/office/drawing/2014/main" id="{472E3A19-F5D5-48FC-BB9C-48C2F68F598B}"/>
+              </a:ext>
+              <a:ext uri="{C183D7F6-B498-43B3-948B-1728B52AA6E4}">
+                <adec:decorative xmlns:adec="http://schemas.microsoft.com/office/drawing/2017/decorative" val="1"/>
+              </a:ext>
+            </a:extLst>
+          </p:cNvPr>
+          <p:cNvSpPr>
+            <a:spLocks noGrp="1" noRot="1" noChangeAspect="1" noMove="1" noResize="1" noEditPoints="1" noAdjustHandles="1" noChangeArrowheads="1" noChangeShapeType="1" noTextEdit="1"/>
+          </p:cNvSpPr>
+          <p:nvPr>
+            <p:extLst>
+              <p:ext uri="{386F3935-93C4-4BCD-93E2-E3B085C9AB24}">
+                <p16:designElem xmlns:p16="http://schemas.microsoft.com/office/powerpoint/2015/main" val="1"/>
+              </p:ext>
+            </p:extLst>
+          </p:nvPr>
+        </p:nvSpPr>
+        <p:spPr bwMode="auto">
+          <a:xfrm>
+            <a:off x="644660" y="640894"/>
+            <a:ext cx="168275" cy="1713195"/>
+          </a:xfrm>
+          <a:custGeom>
+            <a:avLst/>
+            <a:gdLst>
+              <a:gd name="T0" fmla="*/ 106 w 106"/>
+              <a:gd name="T1" fmla="*/ 1114 h 1114"/>
+              <a:gd name="T2" fmla="*/ 0 w 106"/>
+              <a:gd name="T3" fmla="*/ 1005 h 1114"/>
+              <a:gd name="T4" fmla="*/ 0 w 106"/>
+              <a:gd name="T5" fmla="*/ 0 h 1114"/>
+              <a:gd name="T6" fmla="*/ 106 w 106"/>
+              <a:gd name="T7" fmla="*/ 110 h 1114"/>
+              <a:gd name="T8" fmla="*/ 106 w 106"/>
+              <a:gd name="T9" fmla="*/ 1114 h 1114"/>
+            </a:gdLst>
+            <a:ahLst/>
+            <a:cxnLst>
+              <a:cxn ang="0">
+                <a:pos x="T0" y="T1"/>
+              </a:cxn>
+              <a:cxn ang="0">
+                <a:pos x="T2" y="T3"/>
+              </a:cxn>
+              <a:cxn ang="0">
+                <a:pos x="T4" y="T5"/>
+              </a:cxn>
+              <a:cxn ang="0">
+                <a:pos x="T6" y="T7"/>
+              </a:cxn>
+              <a:cxn ang="0">
+                <a:pos x="T8" y="T9"/>
+              </a:cxn>
+            </a:cxnLst>
+            <a:rect l="0" t="0" r="r" b="b"/>
+            <a:pathLst>
+              <a:path w="106" h="1114">
+                <a:moveTo>
+                  <a:pt x="106" y="1114"/>
+                </a:moveTo>
+                <a:lnTo>
+                  <a:pt x="0" y="1005"/>
+                </a:lnTo>
+                <a:lnTo>
+                  <a:pt x="0" y="0"/>
+                </a:lnTo>
+                <a:lnTo>
+                  <a:pt x="106" y="110"/>
+                </a:lnTo>
+                <a:lnTo>
+                  <a:pt x="106" y="1114"/>
+                </a:lnTo>
+                <a:close/>
+              </a:path>
+            </a:pathLst>
+          </a:custGeom>
+          <a:solidFill>
+            <a:schemeClr val="accent1">
+              <a:lumMod val="50000"/>
+            </a:schemeClr>
+          </a:solidFill>
+          <a:ln>
+            <a:noFill/>
+          </a:ln>
+        </p:spPr>
+        <p:txBody>
+          <a:bodyPr vert="horz" wrap="square" lIns="91440" tIns="45720" rIns="91440" bIns="45720" numCol="1" anchor="t" anchorCtr="0" compatLnSpc="1">
+            <a:prstTxWarp prst="textNoShape">
+              <a:avLst/>
+            </a:prstTxWarp>
+          </a:bodyPr>
+          <a:lstStyle/>
+          <a:p>
+            <a:endParaRPr lang="en-US"/>
+          </a:p>
+        </p:txBody>
+      </p:sp>
+      <p:sp>
+        <p:nvSpPr>
+          <p:cNvPr id="16" name="Freeform 44">
+            <a:extLst>
+              <a:ext uri="{FF2B5EF4-FFF2-40B4-BE49-F238E27FC236}">
+                <a16:creationId xmlns:a16="http://schemas.microsoft.com/office/drawing/2014/main" id="{7A62E32F-BB65-43A8-8EB5-92346890E549}"/>
+              </a:ext>
+              <a:ext uri="{C183D7F6-B498-43B3-948B-1728B52AA6E4}">
+                <adec:decorative xmlns:adec="http://schemas.microsoft.com/office/drawing/2017/decorative" val="1"/>
+              </a:ext>
+            </a:extLst>
+          </p:cNvPr>
+          <p:cNvSpPr>
+            <a:spLocks noGrp="1" noRot="1" noChangeAspect="1" noMove="1" noResize="1" noEditPoints="1" noAdjustHandles="1" noChangeArrowheads="1" noChangeShapeType="1" noTextEdit="1"/>
+          </p:cNvSpPr>
+          <p:nvPr>
+            <p:extLst>
+              <p:ext uri="{386F3935-93C4-4BCD-93E2-E3B085C9AB24}">
+                <p16:designElem xmlns:p16="http://schemas.microsoft.com/office/powerpoint/2015/main" val="1"/>
+              </p:ext>
+            </p:extLst>
+          </p:nvPr>
+        </p:nvSpPr>
+        <p:spPr bwMode="auto">
+          <a:xfrm>
+            <a:off x="11223203" y="635716"/>
+            <a:ext cx="328612" cy="1742360"/>
+          </a:xfrm>
+          <a:custGeom>
+            <a:avLst/>
+            <a:gdLst>
+              <a:gd name="T0" fmla="*/ 207 w 207"/>
+              <a:gd name="T1" fmla="*/ 987 h 1114"/>
+              <a:gd name="T2" fmla="*/ 0 w 207"/>
+              <a:gd name="T3" fmla="*/ 1114 h 1114"/>
+              <a:gd name="T4" fmla="*/ 0 w 207"/>
+              <a:gd name="T5" fmla="*/ 127 h 1114"/>
+              <a:gd name="T6" fmla="*/ 207 w 207"/>
+              <a:gd name="T7" fmla="*/ 0 h 1114"/>
+              <a:gd name="T8" fmla="*/ 207 w 207"/>
+              <a:gd name="T9" fmla="*/ 987 h 1114"/>
+            </a:gdLst>
+            <a:ahLst/>
+            <a:cxnLst>
+              <a:cxn ang="0">
+                <a:pos x="T0" y="T1"/>
+              </a:cxn>
+              <a:cxn ang="0">
+                <a:pos x="T2" y="T3"/>
+              </a:cxn>
+              <a:cxn ang="0">
+                <a:pos x="T4" y="T5"/>
+              </a:cxn>
+              <a:cxn ang="0">
+                <a:pos x="T6" y="T7"/>
+              </a:cxn>
+              <a:cxn ang="0">
+                <a:pos x="T8" y="T9"/>
+              </a:cxn>
+            </a:cxnLst>
+            <a:rect l="0" t="0" r="r" b="b"/>
+            <a:pathLst>
+              <a:path w="207" h="1114">
+                <a:moveTo>
+                  <a:pt x="207" y="987"/>
+                </a:moveTo>
+                <a:lnTo>
+                  <a:pt x="0" y="1114"/>
+                </a:lnTo>
+                <a:lnTo>
+                  <a:pt x="0" y="127"/>
+                </a:lnTo>
+                <a:lnTo>
+                  <a:pt x="207" y="0"/>
+                </a:lnTo>
+                <a:lnTo>
+                  <a:pt x="207" y="987"/>
+                </a:lnTo>
+                <a:close/>
+              </a:path>
+            </a:pathLst>
+          </a:custGeom>
+          <a:solidFill>
+            <a:schemeClr val="accent1">
+              <a:lumMod val="50000"/>
+            </a:schemeClr>
+          </a:solidFill>
+          <a:ln>
+            <a:noFill/>
+          </a:ln>
+        </p:spPr>
+        <p:txBody>
+          <a:bodyPr vert="horz" wrap="square" lIns="91440" tIns="45720" rIns="91440" bIns="45720" numCol="1" anchor="t" anchorCtr="0" compatLnSpc="1">
+            <a:prstTxWarp prst="textNoShape">
+              <a:avLst/>
+            </a:prstTxWarp>
+          </a:bodyPr>
+          <a:lstStyle/>
+          <a:p>
+            <a:endParaRPr lang="en-US"/>
+          </a:p>
+        </p:txBody>
+      </p:sp>
+      <p:sp>
+        <p:nvSpPr>
+          <p:cNvPr id="18" name="Rectangle 17">
+            <a:extLst>
+              <a:ext uri="{FF2B5EF4-FFF2-40B4-BE49-F238E27FC236}">
+                <a16:creationId xmlns:a16="http://schemas.microsoft.com/office/drawing/2014/main" id="{14E91B64-9FCC-451E-AFB4-A827D6329367}"/>
+              </a:ext>
+              <a:ext uri="{C183D7F6-B498-43B3-948B-1728B52AA6E4}">
+                <adec:decorative xmlns:adec="http://schemas.microsoft.com/office/drawing/2017/decorative" val="1"/>
+              </a:ext>
+            </a:extLst>
+          </p:cNvPr>
+          <p:cNvSpPr>
+            <a:spLocks noGrp="1" noRot="1" noChangeAspect="1" noMove="1" noResize="1" noEditPoints="1" noAdjustHandles="1" noChangeArrowheads="1" noChangeShapeType="1" noTextEdit="1"/>
+          </p:cNvSpPr>
+          <p:nvPr>
+            <p:extLst>
+              <p:ext uri="{386F3935-93C4-4BCD-93E2-E3B085C9AB24}">
+                <p16:designElem xmlns:p16="http://schemas.microsoft.com/office/powerpoint/2015/main" val="1"/>
+              </p:ext>
+            </p:extLst>
+          </p:nvPr>
+        </p:nvSpPr>
+        <p:spPr bwMode="auto">
+          <a:xfrm>
+            <a:off x="644055" y="635715"/>
+            <a:ext cx="10907863" cy="1541457"/>
+          </a:xfrm>
+          <a:prstGeom prst="rect">
+            <a:avLst/>
+          </a:prstGeom>
+          <a:solidFill>
+            <a:schemeClr val="accent1"/>
+          </a:solidFill>
+          <a:ln>
+            <a:noFill/>
+          </a:ln>
+        </p:spPr>
+        <p:txBody>
+          <a:bodyPr vert="horz" wrap="square" lIns="91440" tIns="45720" rIns="91440" bIns="45720" numCol="1" anchor="t" anchorCtr="0" compatLnSpc="1">
+            <a:prstTxWarp prst="textNoShape">
+              <a:avLst/>
+            </a:prstTxWarp>
+          </a:bodyPr>
+          <a:lstStyle/>
+          <a:p>
+            <a:endParaRPr lang="en-US"/>
+          </a:p>
+        </p:txBody>
+      </p:sp>
+      <p:sp>
+        <p:nvSpPr>
+          <p:cNvPr id="2" name="Titre 1">
+            <a:extLst>
+              <a:ext uri="{FF2B5EF4-FFF2-40B4-BE49-F238E27FC236}">
+                <a16:creationId xmlns:a16="http://schemas.microsoft.com/office/drawing/2014/main" id="{787733BC-219D-49C7-B5B4-F7CD9774C6A4}"/>
+              </a:ext>
+            </a:extLst>
+          </p:cNvPr>
+          <p:cNvSpPr>
+            <a:spLocks noGrp="1"/>
+          </p:cNvSpPr>
+          <p:nvPr>
+            <p:ph type="title"/>
+          </p:nvPr>
+        </p:nvSpPr>
+        <p:spPr>
+          <a:xfrm>
+            <a:off x="958506" y="800392"/>
+            <a:ext cx="10264697" cy="1212102"/>
+          </a:xfrm>
+        </p:spPr>
+        <p:txBody>
+          <a:bodyPr>
+            <a:normAutofit/>
+          </a:bodyPr>
+          <a:lstStyle/>
+          <a:p>
+            <a:r>
+              <a:rPr lang="fr-FR" sz="4000" dirty="0">
+                <a:solidFill>
+                  <a:srgbClr val="FFFFFF"/>
+                </a:solidFill>
+              </a:rPr>
+              <a:t>Formulaires</a:t>
+            </a:r>
+          </a:p>
+        </p:txBody>
+      </p:sp>
+      <p:sp>
+        <p:nvSpPr>
+          <p:cNvPr id="9" name="Espace réservé du numéro de diapositive 8">
+            <a:extLst>
+              <a:ext uri="{FF2B5EF4-FFF2-40B4-BE49-F238E27FC236}">
+                <a16:creationId xmlns:a16="http://schemas.microsoft.com/office/drawing/2014/main" id="{F3EDF272-70D0-418F-B1E4-090F125EAE69}"/>
+              </a:ext>
+            </a:extLst>
+          </p:cNvPr>
+          <p:cNvSpPr>
+            <a:spLocks noGrp="1"/>
+          </p:cNvSpPr>
+          <p:nvPr>
+            <p:ph type="sldNum" sz="quarter" idx="12"/>
+          </p:nvPr>
+        </p:nvSpPr>
+        <p:spPr/>
+        <p:txBody>
+          <a:bodyPr/>
+          <a:lstStyle/>
+          <a:p>
+            <a:fld id="{F8323CC4-5E62-4ADB-BC7C-89B23C89378E}" type="slidenum">
+              <a:rPr lang="fr-FR" smtClean="0"/>
+              <a:t>26</a:t>
+            </a:fld>
+            <a:endParaRPr lang="fr-FR"/>
+          </a:p>
+        </p:txBody>
+      </p:sp>
+      <p:pic>
+        <p:nvPicPr>
+          <p:cNvPr id="6" name="Image 5">
+            <a:extLst>
+              <a:ext uri="{FF2B5EF4-FFF2-40B4-BE49-F238E27FC236}">
+                <a16:creationId xmlns:a16="http://schemas.microsoft.com/office/drawing/2014/main" id="{F9E1CB56-D2B8-4A38-BA2D-7D9A22393CFB}"/>
+              </a:ext>
+            </a:extLst>
+          </p:cNvPr>
+          <p:cNvPicPr>
+            <a:picLocks noChangeAspect="1"/>
+          </p:cNvPicPr>
+          <p:nvPr/>
         </p:nvPicPr>
         <p:blipFill>
-          <a:blip r:embed="rId2">
-            <a:extLst>
-              <a:ext uri="{28A0092B-C50C-407E-A947-70E740481C1C}">
-                <a14:useLocalDpi xmlns:a14="http://schemas.microsoft.com/office/drawing/2010/main" val="0"/>
-              </a:ext>
-            </a:extLst>
-          </a:blip>
+          <a:blip r:embed="rId2"/>
           <a:stretch>
             <a:fillRect/>
           </a:stretch>
         </p:blipFill>
         <p:spPr>
           <a:xfrm>
-            <a:off x="0" y="0"/>
-            <a:ext cx="12192000" cy="6858000"/>
+            <a:off x="1333481" y="2419171"/>
+            <a:ext cx="3432482" cy="2991360"/>
           </a:xfrm>
           <a:prstGeom prst="rect">
             <a:avLst/>
@@ -14954,105 +15093,225 @@
       </p:pic>
       <p:sp>
         <p:nvSpPr>
-          <p:cNvPr id="2" name="Titre 1">
-            <a:extLst>
-              <a:ext uri="{FF2B5EF4-FFF2-40B4-BE49-F238E27FC236}">
-                <a16:creationId xmlns:a16="http://schemas.microsoft.com/office/drawing/2014/main" id="{AEF9E91C-9F1A-4BEE-A693-D76078DE9F48}"/>
-              </a:ext>
-            </a:extLst>
-          </p:cNvPr>
-          <p:cNvSpPr>
-            <a:spLocks noGrp="1"/>
-          </p:cNvSpPr>
-          <p:nvPr>
-            <p:ph type="title"/>
-          </p:nvPr>
+          <p:cNvPr id="13" name="Flèche : droite 12">
+            <a:extLst>
+              <a:ext uri="{FF2B5EF4-FFF2-40B4-BE49-F238E27FC236}">
+                <a16:creationId xmlns:a16="http://schemas.microsoft.com/office/drawing/2014/main" id="{8AEECA8E-C7FE-469D-B082-99DEF04C93C6}"/>
+              </a:ext>
+            </a:extLst>
+          </p:cNvPr>
+          <p:cNvSpPr/>
+          <p:nvPr/>
         </p:nvSpPr>
         <p:spPr>
           <a:xfrm>
-            <a:off x="3045368" y="2043663"/>
-            <a:ext cx="6105194" cy="2031055"/>
-          </a:xfrm>
-        </p:spPr>
-        <p:txBody>
-          <a:bodyPr vert="horz" lIns="91440" tIns="45720" rIns="91440" bIns="45720" rtlCol="0" anchor="b">
-            <a:normAutofit/>
+            <a:off x="4890287" y="3594556"/>
+            <a:ext cx="1205713" cy="480290"/>
+          </a:xfrm>
+          <a:prstGeom prst="rightArrow">
+            <a:avLst/>
+          </a:prstGeom>
+        </p:spPr>
+        <p:style>
+          <a:lnRef idx="2">
+            <a:schemeClr val="accent1">
+              <a:shade val="50000"/>
+            </a:schemeClr>
+          </a:lnRef>
+          <a:fillRef idx="1">
+            <a:schemeClr val="accent1"/>
+          </a:fillRef>
+          <a:effectRef idx="0">
+            <a:schemeClr val="accent1"/>
+          </a:effectRef>
+          <a:fontRef idx="minor">
+            <a:schemeClr val="lt1"/>
+          </a:fontRef>
+        </p:style>
+        <p:txBody>
+          <a:bodyPr rtlCol="0" anchor="ctr"/>
+          <a:lstStyle/>
+          <a:p>
+            <a:pPr algn="ctr"/>
+            <a:endParaRPr lang="fr-FR"/>
+          </a:p>
+        </p:txBody>
+      </p:sp>
+      <p:pic>
+        <p:nvPicPr>
+          <p:cNvPr id="17" name="Image 16">
+            <a:extLst>
+              <a:ext uri="{FF2B5EF4-FFF2-40B4-BE49-F238E27FC236}">
+                <a16:creationId xmlns:a16="http://schemas.microsoft.com/office/drawing/2014/main" id="{6ABDADB3-4AE5-4DA9-BCEB-AC278BE194F3}"/>
+              </a:ext>
+            </a:extLst>
+          </p:cNvPr>
+          <p:cNvPicPr>
+            <a:picLocks noChangeAspect="1"/>
+          </p:cNvPicPr>
+          <p:nvPr/>
+        </p:nvPicPr>
+        <p:blipFill>
+          <a:blip r:embed="rId3"/>
+          <a:stretch>
+            <a:fillRect/>
+          </a:stretch>
+        </p:blipFill>
+        <p:spPr>
+          <a:xfrm>
+            <a:off x="611321" y="6175540"/>
+            <a:ext cx="4829849" cy="419158"/>
+          </a:xfrm>
+          <a:prstGeom prst="rect">
+            <a:avLst/>
+          </a:prstGeom>
+        </p:spPr>
+      </p:pic>
+      <p:pic>
+        <p:nvPicPr>
+          <p:cNvPr id="24" name="Image 23">
+            <a:extLst>
+              <a:ext uri="{FF2B5EF4-FFF2-40B4-BE49-F238E27FC236}">
+                <a16:creationId xmlns:a16="http://schemas.microsoft.com/office/drawing/2014/main" id="{BCDC707A-3153-41FA-8783-D04EC5059B7D}"/>
+              </a:ext>
+            </a:extLst>
+          </p:cNvPr>
+          <p:cNvPicPr>
+            <a:picLocks noChangeAspect="1"/>
+          </p:cNvPicPr>
+          <p:nvPr/>
+        </p:nvPicPr>
+        <p:blipFill>
+          <a:blip r:embed="rId4"/>
+          <a:stretch>
+            <a:fillRect/>
+          </a:stretch>
+        </p:blipFill>
+        <p:spPr>
+          <a:xfrm>
+            <a:off x="7956573" y="6137612"/>
+            <a:ext cx="1190791" cy="466790"/>
+          </a:xfrm>
+          <a:prstGeom prst="rect">
+            <a:avLst/>
+          </a:prstGeom>
+        </p:spPr>
+      </p:pic>
+      <p:pic>
+        <p:nvPicPr>
+          <p:cNvPr id="26" name="Image 25">
+            <a:extLst>
+              <a:ext uri="{FF2B5EF4-FFF2-40B4-BE49-F238E27FC236}">
+                <a16:creationId xmlns:a16="http://schemas.microsoft.com/office/drawing/2014/main" id="{C76A4E75-9AF7-4D99-90F4-6FF0F0C7011D}"/>
+              </a:ext>
+            </a:extLst>
+          </p:cNvPr>
+          <p:cNvPicPr>
+            <a:picLocks noChangeAspect="1"/>
+          </p:cNvPicPr>
+          <p:nvPr/>
+        </p:nvPicPr>
+        <p:blipFill>
+          <a:blip r:embed="rId5"/>
+          <a:stretch>
+            <a:fillRect/>
+          </a:stretch>
+        </p:blipFill>
+        <p:spPr>
+          <a:xfrm>
+            <a:off x="6206209" y="3252500"/>
+            <a:ext cx="5982535" cy="1162212"/>
+          </a:xfrm>
+          <a:prstGeom prst="rect">
+            <a:avLst/>
+          </a:prstGeom>
+        </p:spPr>
+      </p:pic>
+      <p:sp>
+        <p:nvSpPr>
+          <p:cNvPr id="27" name="Flèche : droite 26">
+            <a:extLst>
+              <a:ext uri="{FF2B5EF4-FFF2-40B4-BE49-F238E27FC236}">
+                <a16:creationId xmlns:a16="http://schemas.microsoft.com/office/drawing/2014/main" id="{4C92A56E-DEBE-4611-9F94-4BF3011E108D}"/>
+              </a:ext>
+            </a:extLst>
+          </p:cNvPr>
+          <p:cNvSpPr/>
+          <p:nvPr/>
+        </p:nvSpPr>
+        <p:spPr>
+          <a:xfrm>
+            <a:off x="6118563" y="6055877"/>
+            <a:ext cx="1205713" cy="480290"/>
+          </a:xfrm>
+          <a:prstGeom prst="rightArrow">
+            <a:avLst/>
+          </a:prstGeom>
+        </p:spPr>
+        <p:style>
+          <a:lnRef idx="2">
+            <a:schemeClr val="accent1">
+              <a:shade val="50000"/>
+            </a:schemeClr>
+          </a:lnRef>
+          <a:fillRef idx="1">
+            <a:schemeClr val="accent1"/>
+          </a:fillRef>
+          <a:effectRef idx="0">
+            <a:schemeClr val="accent1"/>
+          </a:effectRef>
+          <a:fontRef idx="minor">
+            <a:schemeClr val="lt1"/>
+          </a:fontRef>
+        </p:style>
+        <p:txBody>
+          <a:bodyPr rtlCol="0" anchor="ctr"/>
+          <a:lstStyle/>
+          <a:p>
+            <a:pPr algn="ctr"/>
+            <a:endParaRPr lang="fr-FR"/>
+          </a:p>
+        </p:txBody>
+      </p:sp>
+      <p:sp>
+        <p:nvSpPr>
+          <p:cNvPr id="28" name="ZoneTexte 27">
+            <a:extLst>
+              <a:ext uri="{FF2B5EF4-FFF2-40B4-BE49-F238E27FC236}">
+                <a16:creationId xmlns:a16="http://schemas.microsoft.com/office/drawing/2014/main" id="{59D4B96E-419E-4D2C-989B-7923B5E816F2}"/>
+              </a:ext>
+            </a:extLst>
+          </p:cNvPr>
+          <p:cNvSpPr txBox="1"/>
+          <p:nvPr/>
+        </p:nvSpPr>
+        <p:spPr>
+          <a:xfrm>
+            <a:off x="4765963" y="5521867"/>
+            <a:ext cx="2807855" cy="461665"/>
+          </a:xfrm>
+          <a:prstGeom prst="rect">
+            <a:avLst/>
+          </a:prstGeom>
+          <a:noFill/>
+        </p:spPr>
+        <p:txBody>
+          <a:bodyPr wrap="square" rtlCol="0">
+            <a:spAutoFit/>
           </a:bodyPr>
           <a:lstStyle/>
           <a:p>
-            <a:pPr algn="ctr"/>
             <a:r>
-              <a:rPr lang="en-US" sz="6000" kern="1200">
-                <a:solidFill>
-                  <a:srgbClr val="FFFFFF"/>
-                </a:solidFill>
-                <a:latin typeface="+mj-lt"/>
-                <a:ea typeface="+mj-ea"/>
-                <a:cs typeface="+mj-cs"/>
-              </a:rPr>
-              <a:t>Exercice 7 – Mise en forme </a:t>
+              <a:rPr lang="fr-FR" sz="2400" dirty="0"/>
+              <a:t>Affichage :</a:t>
             </a:r>
-          </a:p>
-        </p:txBody>
-      </p:sp>
-      <p:sp>
-        <p:nvSpPr>
-          <p:cNvPr id="4" name="Espace réservé du numéro de diapositive 3">
-            <a:extLst>
-              <a:ext uri="{FF2B5EF4-FFF2-40B4-BE49-F238E27FC236}">
-                <a16:creationId xmlns:a16="http://schemas.microsoft.com/office/drawing/2014/main" id="{74F3023A-B7CB-4C5A-A04F-98974204E143}"/>
-              </a:ext>
-            </a:extLst>
-          </p:cNvPr>
-          <p:cNvSpPr>
-            <a:spLocks noGrp="1"/>
-          </p:cNvSpPr>
-          <p:nvPr>
-            <p:ph type="sldNum" sz="quarter" idx="12"/>
-          </p:nvPr>
-        </p:nvSpPr>
-        <p:spPr>
-          <a:xfrm>
-            <a:off x="10825930" y="6223702"/>
-            <a:ext cx="570728" cy="314067"/>
-          </a:xfrm>
-        </p:spPr>
-        <p:txBody>
-          <a:bodyPr vert="horz" lIns="91440" tIns="45720" rIns="91440" bIns="45720" rtlCol="0" anchor="ctr">
-            <a:normAutofit/>
-          </a:bodyPr>
-          <a:lstStyle/>
-          <a:p>
-            <a:pPr>
-              <a:spcAft>
-                <a:spcPts val="600"/>
-              </a:spcAft>
-            </a:pPr>
-            <a:fld id="{F8323CC4-5E62-4ADB-BC7C-89B23C89378E}" type="slidenum">
-              <a:rPr lang="en-US" sz="1000">
-                <a:solidFill>
-                  <a:srgbClr val="898989"/>
-                </a:solidFill>
-              </a:rPr>
-              <a:pPr>
-                <a:spcAft>
-                  <a:spcPts val="600"/>
-                </a:spcAft>
-              </a:pPr>
-              <a:t>26</a:t>
-            </a:fld>
-            <a:endParaRPr lang="en-US" sz="1000">
-              <a:solidFill>
-                <a:srgbClr val="898989"/>
-              </a:solidFill>
-            </a:endParaRPr>
           </a:p>
         </p:txBody>
       </p:sp>
     </p:spTree>
     <p:extLst>
       <p:ext uri="{BB962C8B-B14F-4D97-AF65-F5344CB8AC3E}">
-        <p14:creationId xmlns:p14="http://schemas.microsoft.com/office/powerpoint/2010/main" val="2800563334"/>
+        <p14:creationId xmlns:p14="http://schemas.microsoft.com/office/powerpoint/2010/main" val="810595131"/>
       </p:ext>
     </p:extLst>
   </p:cSld>
@@ -15087,881 +15346,6 @@
           <a:chExt cx="0" cy="0"/>
         </a:xfrm>
       </p:grpSpPr>
-      <p:sp useBgFill="1">
-        <p:nvSpPr>
-          <p:cNvPr id="8" name="Rectangle 7">
-            <a:extLst>
-              <a:ext uri="{FF2B5EF4-FFF2-40B4-BE49-F238E27FC236}">
-                <a16:creationId xmlns:a16="http://schemas.microsoft.com/office/drawing/2014/main" id="{827B839B-9ADE-406B-8590-F1CAEDED45A1}"/>
-              </a:ext>
-              <a:ext uri="{C183D7F6-B498-43B3-948B-1728B52AA6E4}">
-                <adec:decorative xmlns:adec="http://schemas.microsoft.com/office/drawing/2017/decorative" val="1"/>
-              </a:ext>
-            </a:extLst>
-          </p:cNvPr>
-          <p:cNvSpPr>
-            <a:spLocks noGrp="1" noRot="1" noChangeAspect="1" noMove="1" noResize="1" noEditPoints="1" noAdjustHandles="1" noChangeArrowheads="1" noChangeShapeType="1" noTextEdit="1"/>
-          </p:cNvSpPr>
-          <p:nvPr>
-            <p:extLst>
-              <p:ext uri="{386F3935-93C4-4BCD-93E2-E3B085C9AB24}">
-                <p16:designElem xmlns:p16="http://schemas.microsoft.com/office/powerpoint/2015/main" val="1"/>
-              </p:ext>
-            </p:extLst>
-          </p:nvPr>
-        </p:nvSpPr>
-        <p:spPr>
-          <a:xfrm>
-            <a:off x="0" y="0"/>
-            <a:ext cx="12188952" cy="6858000"/>
-          </a:xfrm>
-          <a:prstGeom prst="rect">
-            <a:avLst/>
-          </a:prstGeom>
-          <a:ln>
-            <a:noFill/>
-          </a:ln>
-        </p:spPr>
-        <p:style>
-          <a:lnRef idx="2">
-            <a:schemeClr val="accent1">
-              <a:shade val="50000"/>
-            </a:schemeClr>
-          </a:lnRef>
-          <a:fillRef idx="1">
-            <a:schemeClr val="accent1"/>
-          </a:fillRef>
-          <a:effectRef idx="0">
-            <a:schemeClr val="accent1"/>
-          </a:effectRef>
-          <a:fontRef idx="minor">
-            <a:schemeClr val="lt1"/>
-          </a:fontRef>
-        </p:style>
-        <p:txBody>
-          <a:bodyPr rtlCol="0" anchor="ctr"/>
-          <a:lstStyle/>
-          <a:p>
-            <a:pPr algn="ctr"/>
-            <a:endParaRPr lang="en-US"/>
-          </a:p>
-        </p:txBody>
-      </p:sp>
-      <p:sp>
-        <p:nvSpPr>
-          <p:cNvPr id="10" name="Freeform 45">
-            <a:extLst>
-              <a:ext uri="{FF2B5EF4-FFF2-40B4-BE49-F238E27FC236}">
-                <a16:creationId xmlns:a16="http://schemas.microsoft.com/office/drawing/2014/main" id="{CFE45BF0-46DB-408C-B5F7-7B11716805D4}"/>
-              </a:ext>
-              <a:ext uri="{C183D7F6-B498-43B3-948B-1728B52AA6E4}">
-                <adec:decorative xmlns:adec="http://schemas.microsoft.com/office/drawing/2017/decorative" val="1"/>
-              </a:ext>
-            </a:extLst>
-          </p:cNvPr>
-          <p:cNvSpPr>
-            <a:spLocks noGrp="1" noRot="1" noChangeAspect="1" noMove="1" noResize="1" noEditPoints="1" noAdjustHandles="1" noChangeArrowheads="1" noChangeShapeType="1" noTextEdit="1"/>
-          </p:cNvSpPr>
-          <p:nvPr>
-            <p:extLst>
-              <p:ext uri="{386F3935-93C4-4BCD-93E2-E3B085C9AB24}">
-                <p16:designElem xmlns:p16="http://schemas.microsoft.com/office/powerpoint/2015/main" val="1"/>
-              </p:ext>
-            </p:extLst>
-          </p:nvPr>
-        </p:nvSpPr>
-        <p:spPr bwMode="auto">
-          <a:xfrm>
-            <a:off x="409710" y="1022350"/>
-            <a:ext cx="709612" cy="2095501"/>
-          </a:xfrm>
-          <a:custGeom>
-            <a:avLst/>
-            <a:gdLst>
-              <a:gd name="T0" fmla="*/ 447 w 447"/>
-              <a:gd name="T1" fmla="*/ 1363 h 1363"/>
-              <a:gd name="T2" fmla="*/ 0 w 447"/>
-              <a:gd name="T3" fmla="*/ 987 h 1363"/>
-              <a:gd name="T4" fmla="*/ 0 w 447"/>
-              <a:gd name="T5" fmla="*/ 0 h 1363"/>
-              <a:gd name="T6" fmla="*/ 447 w 447"/>
-              <a:gd name="T7" fmla="*/ 376 h 1363"/>
-              <a:gd name="T8" fmla="*/ 447 w 447"/>
-              <a:gd name="T9" fmla="*/ 1363 h 1363"/>
-            </a:gdLst>
-            <a:ahLst/>
-            <a:cxnLst>
-              <a:cxn ang="0">
-                <a:pos x="T0" y="T1"/>
-              </a:cxn>
-              <a:cxn ang="0">
-                <a:pos x="T2" y="T3"/>
-              </a:cxn>
-              <a:cxn ang="0">
-                <a:pos x="T4" y="T5"/>
-              </a:cxn>
-              <a:cxn ang="0">
-                <a:pos x="T6" y="T7"/>
-              </a:cxn>
-              <a:cxn ang="0">
-                <a:pos x="T8" y="T9"/>
-              </a:cxn>
-            </a:cxnLst>
-            <a:rect l="0" t="0" r="r" b="b"/>
-            <a:pathLst>
-              <a:path w="447" h="1363">
-                <a:moveTo>
-                  <a:pt x="447" y="1363"/>
-                </a:moveTo>
-                <a:lnTo>
-                  <a:pt x="0" y="987"/>
-                </a:lnTo>
-                <a:lnTo>
-                  <a:pt x="0" y="0"/>
-                </a:lnTo>
-                <a:lnTo>
-                  <a:pt x="447" y="376"/>
-                </a:lnTo>
-                <a:lnTo>
-                  <a:pt x="447" y="1363"/>
-                </a:lnTo>
-                <a:close/>
-              </a:path>
-            </a:pathLst>
-          </a:custGeom>
-          <a:solidFill>
-            <a:schemeClr val="accent1">
-              <a:lumMod val="50000"/>
-            </a:schemeClr>
-          </a:solidFill>
-          <a:ln>
-            <a:noFill/>
-          </a:ln>
-        </p:spPr>
-        <p:txBody>
-          <a:bodyPr vert="horz" wrap="square" lIns="91440" tIns="45720" rIns="91440" bIns="45720" numCol="1" anchor="t" anchorCtr="0" compatLnSpc="1">
-            <a:prstTxWarp prst="textNoShape">
-              <a:avLst/>
-            </a:prstTxWarp>
-          </a:bodyPr>
-          <a:lstStyle/>
-          <a:p>
-            <a:endParaRPr lang="en-US"/>
-          </a:p>
-        </p:txBody>
-      </p:sp>
-      <p:sp>
-        <p:nvSpPr>
-          <p:cNvPr id="12" name="Freeform 46">
-            <a:extLst>
-              <a:ext uri="{FF2B5EF4-FFF2-40B4-BE49-F238E27FC236}">
-                <a16:creationId xmlns:a16="http://schemas.microsoft.com/office/drawing/2014/main" id="{2AEBC8F2-97B1-41B4-93F1-2D289E197FBA}"/>
-              </a:ext>
-              <a:ext uri="{C183D7F6-B498-43B3-948B-1728B52AA6E4}">
-                <adec:decorative xmlns:adec="http://schemas.microsoft.com/office/drawing/2017/decorative" val="1"/>
-              </a:ext>
-            </a:extLst>
-          </p:cNvPr>
-          <p:cNvSpPr>
-            <a:spLocks noGrp="1" noRot="1" noChangeAspect="1" noMove="1" noResize="1" noEditPoints="1" noAdjustHandles="1" noChangeArrowheads="1" noChangeShapeType="1" noTextEdit="1"/>
-          </p:cNvSpPr>
-          <p:nvPr>
-            <p:extLst>
-              <p:ext uri="{386F3935-93C4-4BCD-93E2-E3B085C9AB24}">
-                <p16:designElem xmlns:p16="http://schemas.microsoft.com/office/powerpoint/2015/main" val="1"/>
-              </p:ext>
-            </p:extLst>
-          </p:nvPr>
-        </p:nvSpPr>
-        <p:spPr bwMode="auto">
-          <a:xfrm>
-            <a:off x="409710" y="837744"/>
-            <a:ext cx="403225" cy="1705431"/>
-          </a:xfrm>
-          <a:custGeom>
-            <a:avLst/>
-            <a:gdLst>
-              <a:gd name="T0" fmla="*/ 254 w 254"/>
-              <a:gd name="T1" fmla="*/ 987 h 1109"/>
-              <a:gd name="T2" fmla="*/ 0 w 254"/>
-              <a:gd name="T3" fmla="*/ 1109 h 1109"/>
-              <a:gd name="T4" fmla="*/ 0 w 254"/>
-              <a:gd name="T5" fmla="*/ 119 h 1109"/>
-              <a:gd name="T6" fmla="*/ 254 w 254"/>
-              <a:gd name="T7" fmla="*/ 0 h 1109"/>
-              <a:gd name="T8" fmla="*/ 254 w 254"/>
-              <a:gd name="T9" fmla="*/ 987 h 1109"/>
-            </a:gdLst>
-            <a:ahLst/>
-            <a:cxnLst>
-              <a:cxn ang="0">
-                <a:pos x="T0" y="T1"/>
-              </a:cxn>
-              <a:cxn ang="0">
-                <a:pos x="T2" y="T3"/>
-              </a:cxn>
-              <a:cxn ang="0">
-                <a:pos x="T4" y="T5"/>
-              </a:cxn>
-              <a:cxn ang="0">
-                <a:pos x="T6" y="T7"/>
-              </a:cxn>
-              <a:cxn ang="0">
-                <a:pos x="T8" y="T9"/>
-              </a:cxn>
-            </a:cxnLst>
-            <a:rect l="0" t="0" r="r" b="b"/>
-            <a:pathLst>
-              <a:path w="254" h="1109">
-                <a:moveTo>
-                  <a:pt x="254" y="987"/>
-                </a:moveTo>
-                <a:lnTo>
-                  <a:pt x="0" y="1109"/>
-                </a:lnTo>
-                <a:lnTo>
-                  <a:pt x="0" y="119"/>
-                </a:lnTo>
-                <a:lnTo>
-                  <a:pt x="254" y="0"/>
-                </a:lnTo>
-                <a:lnTo>
-                  <a:pt x="254" y="987"/>
-                </a:lnTo>
-                <a:close/>
-              </a:path>
-            </a:pathLst>
-          </a:custGeom>
-          <a:solidFill>
-            <a:schemeClr val="accent1">
-              <a:lumMod val="75000"/>
-            </a:schemeClr>
-          </a:solidFill>
-          <a:ln>
-            <a:noFill/>
-          </a:ln>
-        </p:spPr>
-        <p:txBody>
-          <a:bodyPr vert="horz" wrap="square" lIns="91440" tIns="45720" rIns="91440" bIns="45720" numCol="1" anchor="t" anchorCtr="0" compatLnSpc="1">
-            <a:prstTxWarp prst="textNoShape">
-              <a:avLst/>
-            </a:prstTxWarp>
-          </a:bodyPr>
-          <a:lstStyle/>
-          <a:p>
-            <a:endParaRPr lang="en-US"/>
-          </a:p>
-        </p:txBody>
-      </p:sp>
-      <p:sp>
-        <p:nvSpPr>
-          <p:cNvPr id="14" name="Freeform 47">
-            <a:extLst>
-              <a:ext uri="{FF2B5EF4-FFF2-40B4-BE49-F238E27FC236}">
-                <a16:creationId xmlns:a16="http://schemas.microsoft.com/office/drawing/2014/main" id="{472E3A19-F5D5-48FC-BB9C-48C2F68F598B}"/>
-              </a:ext>
-              <a:ext uri="{C183D7F6-B498-43B3-948B-1728B52AA6E4}">
-                <adec:decorative xmlns:adec="http://schemas.microsoft.com/office/drawing/2017/decorative" val="1"/>
-              </a:ext>
-            </a:extLst>
-          </p:cNvPr>
-          <p:cNvSpPr>
-            <a:spLocks noGrp="1" noRot="1" noChangeAspect="1" noMove="1" noResize="1" noEditPoints="1" noAdjustHandles="1" noChangeArrowheads="1" noChangeShapeType="1" noTextEdit="1"/>
-          </p:cNvSpPr>
-          <p:nvPr>
-            <p:extLst>
-              <p:ext uri="{386F3935-93C4-4BCD-93E2-E3B085C9AB24}">
-                <p16:designElem xmlns:p16="http://schemas.microsoft.com/office/powerpoint/2015/main" val="1"/>
-              </p:ext>
-            </p:extLst>
-          </p:nvPr>
-        </p:nvSpPr>
-        <p:spPr bwMode="auto">
-          <a:xfrm>
-            <a:off x="644660" y="640894"/>
-            <a:ext cx="168275" cy="1713195"/>
-          </a:xfrm>
-          <a:custGeom>
-            <a:avLst/>
-            <a:gdLst>
-              <a:gd name="T0" fmla="*/ 106 w 106"/>
-              <a:gd name="T1" fmla="*/ 1114 h 1114"/>
-              <a:gd name="T2" fmla="*/ 0 w 106"/>
-              <a:gd name="T3" fmla="*/ 1005 h 1114"/>
-              <a:gd name="T4" fmla="*/ 0 w 106"/>
-              <a:gd name="T5" fmla="*/ 0 h 1114"/>
-              <a:gd name="T6" fmla="*/ 106 w 106"/>
-              <a:gd name="T7" fmla="*/ 110 h 1114"/>
-              <a:gd name="T8" fmla="*/ 106 w 106"/>
-              <a:gd name="T9" fmla="*/ 1114 h 1114"/>
-            </a:gdLst>
-            <a:ahLst/>
-            <a:cxnLst>
-              <a:cxn ang="0">
-                <a:pos x="T0" y="T1"/>
-              </a:cxn>
-              <a:cxn ang="0">
-                <a:pos x="T2" y="T3"/>
-              </a:cxn>
-              <a:cxn ang="0">
-                <a:pos x="T4" y="T5"/>
-              </a:cxn>
-              <a:cxn ang="0">
-                <a:pos x="T6" y="T7"/>
-              </a:cxn>
-              <a:cxn ang="0">
-                <a:pos x="T8" y="T9"/>
-              </a:cxn>
-            </a:cxnLst>
-            <a:rect l="0" t="0" r="r" b="b"/>
-            <a:pathLst>
-              <a:path w="106" h="1114">
-                <a:moveTo>
-                  <a:pt x="106" y="1114"/>
-                </a:moveTo>
-                <a:lnTo>
-                  <a:pt x="0" y="1005"/>
-                </a:lnTo>
-                <a:lnTo>
-                  <a:pt x="0" y="0"/>
-                </a:lnTo>
-                <a:lnTo>
-                  <a:pt x="106" y="110"/>
-                </a:lnTo>
-                <a:lnTo>
-                  <a:pt x="106" y="1114"/>
-                </a:lnTo>
-                <a:close/>
-              </a:path>
-            </a:pathLst>
-          </a:custGeom>
-          <a:solidFill>
-            <a:schemeClr val="accent1">
-              <a:lumMod val="50000"/>
-            </a:schemeClr>
-          </a:solidFill>
-          <a:ln>
-            <a:noFill/>
-          </a:ln>
-        </p:spPr>
-        <p:txBody>
-          <a:bodyPr vert="horz" wrap="square" lIns="91440" tIns="45720" rIns="91440" bIns="45720" numCol="1" anchor="t" anchorCtr="0" compatLnSpc="1">
-            <a:prstTxWarp prst="textNoShape">
-              <a:avLst/>
-            </a:prstTxWarp>
-          </a:bodyPr>
-          <a:lstStyle/>
-          <a:p>
-            <a:endParaRPr lang="en-US"/>
-          </a:p>
-        </p:txBody>
-      </p:sp>
-      <p:sp>
-        <p:nvSpPr>
-          <p:cNvPr id="16" name="Freeform 44">
-            <a:extLst>
-              <a:ext uri="{FF2B5EF4-FFF2-40B4-BE49-F238E27FC236}">
-                <a16:creationId xmlns:a16="http://schemas.microsoft.com/office/drawing/2014/main" id="{7A62E32F-BB65-43A8-8EB5-92346890E549}"/>
-              </a:ext>
-              <a:ext uri="{C183D7F6-B498-43B3-948B-1728B52AA6E4}">
-                <adec:decorative xmlns:adec="http://schemas.microsoft.com/office/drawing/2017/decorative" val="1"/>
-              </a:ext>
-            </a:extLst>
-          </p:cNvPr>
-          <p:cNvSpPr>
-            <a:spLocks noGrp="1" noRot="1" noChangeAspect="1" noMove="1" noResize="1" noEditPoints="1" noAdjustHandles="1" noChangeArrowheads="1" noChangeShapeType="1" noTextEdit="1"/>
-          </p:cNvSpPr>
-          <p:nvPr>
-            <p:extLst>
-              <p:ext uri="{386F3935-93C4-4BCD-93E2-E3B085C9AB24}">
-                <p16:designElem xmlns:p16="http://schemas.microsoft.com/office/powerpoint/2015/main" val="1"/>
-              </p:ext>
-            </p:extLst>
-          </p:nvPr>
-        </p:nvSpPr>
-        <p:spPr bwMode="auto">
-          <a:xfrm>
-            <a:off x="11223203" y="635716"/>
-            <a:ext cx="328612" cy="1742360"/>
-          </a:xfrm>
-          <a:custGeom>
-            <a:avLst/>
-            <a:gdLst>
-              <a:gd name="T0" fmla="*/ 207 w 207"/>
-              <a:gd name="T1" fmla="*/ 987 h 1114"/>
-              <a:gd name="T2" fmla="*/ 0 w 207"/>
-              <a:gd name="T3" fmla="*/ 1114 h 1114"/>
-              <a:gd name="T4" fmla="*/ 0 w 207"/>
-              <a:gd name="T5" fmla="*/ 127 h 1114"/>
-              <a:gd name="T6" fmla="*/ 207 w 207"/>
-              <a:gd name="T7" fmla="*/ 0 h 1114"/>
-              <a:gd name="T8" fmla="*/ 207 w 207"/>
-              <a:gd name="T9" fmla="*/ 987 h 1114"/>
-            </a:gdLst>
-            <a:ahLst/>
-            <a:cxnLst>
-              <a:cxn ang="0">
-                <a:pos x="T0" y="T1"/>
-              </a:cxn>
-              <a:cxn ang="0">
-                <a:pos x="T2" y="T3"/>
-              </a:cxn>
-              <a:cxn ang="0">
-                <a:pos x="T4" y="T5"/>
-              </a:cxn>
-              <a:cxn ang="0">
-                <a:pos x="T6" y="T7"/>
-              </a:cxn>
-              <a:cxn ang="0">
-                <a:pos x="T8" y="T9"/>
-              </a:cxn>
-            </a:cxnLst>
-            <a:rect l="0" t="0" r="r" b="b"/>
-            <a:pathLst>
-              <a:path w="207" h="1114">
-                <a:moveTo>
-                  <a:pt x="207" y="987"/>
-                </a:moveTo>
-                <a:lnTo>
-                  <a:pt x="0" y="1114"/>
-                </a:lnTo>
-                <a:lnTo>
-                  <a:pt x="0" y="127"/>
-                </a:lnTo>
-                <a:lnTo>
-                  <a:pt x="207" y="0"/>
-                </a:lnTo>
-                <a:lnTo>
-                  <a:pt x="207" y="987"/>
-                </a:lnTo>
-                <a:close/>
-              </a:path>
-            </a:pathLst>
-          </a:custGeom>
-          <a:solidFill>
-            <a:schemeClr val="accent1">
-              <a:lumMod val="50000"/>
-            </a:schemeClr>
-          </a:solidFill>
-          <a:ln>
-            <a:noFill/>
-          </a:ln>
-        </p:spPr>
-        <p:txBody>
-          <a:bodyPr vert="horz" wrap="square" lIns="91440" tIns="45720" rIns="91440" bIns="45720" numCol="1" anchor="t" anchorCtr="0" compatLnSpc="1">
-            <a:prstTxWarp prst="textNoShape">
-              <a:avLst/>
-            </a:prstTxWarp>
-          </a:bodyPr>
-          <a:lstStyle/>
-          <a:p>
-            <a:endParaRPr lang="en-US"/>
-          </a:p>
-        </p:txBody>
-      </p:sp>
-      <p:sp>
-        <p:nvSpPr>
-          <p:cNvPr id="18" name="Rectangle 17">
-            <a:extLst>
-              <a:ext uri="{FF2B5EF4-FFF2-40B4-BE49-F238E27FC236}">
-                <a16:creationId xmlns:a16="http://schemas.microsoft.com/office/drawing/2014/main" id="{14E91B64-9FCC-451E-AFB4-A827D6329367}"/>
-              </a:ext>
-              <a:ext uri="{C183D7F6-B498-43B3-948B-1728B52AA6E4}">
-                <adec:decorative xmlns:adec="http://schemas.microsoft.com/office/drawing/2017/decorative" val="1"/>
-              </a:ext>
-            </a:extLst>
-          </p:cNvPr>
-          <p:cNvSpPr>
-            <a:spLocks noGrp="1" noRot="1" noChangeAspect="1" noMove="1" noResize="1" noEditPoints="1" noAdjustHandles="1" noChangeArrowheads="1" noChangeShapeType="1" noTextEdit="1"/>
-          </p:cNvSpPr>
-          <p:nvPr>
-            <p:extLst>
-              <p:ext uri="{386F3935-93C4-4BCD-93E2-E3B085C9AB24}">
-                <p16:designElem xmlns:p16="http://schemas.microsoft.com/office/powerpoint/2015/main" val="1"/>
-              </p:ext>
-            </p:extLst>
-          </p:nvPr>
-        </p:nvSpPr>
-        <p:spPr bwMode="auto">
-          <a:xfrm>
-            <a:off x="644055" y="635715"/>
-            <a:ext cx="10907863" cy="1541457"/>
-          </a:xfrm>
-          <a:prstGeom prst="rect">
-            <a:avLst/>
-          </a:prstGeom>
-          <a:solidFill>
-            <a:schemeClr val="accent1"/>
-          </a:solidFill>
-          <a:ln>
-            <a:noFill/>
-          </a:ln>
-        </p:spPr>
-        <p:txBody>
-          <a:bodyPr vert="horz" wrap="square" lIns="91440" tIns="45720" rIns="91440" bIns="45720" numCol="1" anchor="t" anchorCtr="0" compatLnSpc="1">
-            <a:prstTxWarp prst="textNoShape">
-              <a:avLst/>
-            </a:prstTxWarp>
-          </a:bodyPr>
-          <a:lstStyle/>
-          <a:p>
-            <a:endParaRPr lang="en-US"/>
-          </a:p>
-        </p:txBody>
-      </p:sp>
-      <p:sp>
-        <p:nvSpPr>
-          <p:cNvPr id="2" name="Titre 1">
-            <a:extLst>
-              <a:ext uri="{FF2B5EF4-FFF2-40B4-BE49-F238E27FC236}">
-                <a16:creationId xmlns:a16="http://schemas.microsoft.com/office/drawing/2014/main" id="{787733BC-219D-49C7-B5B4-F7CD9774C6A4}"/>
-              </a:ext>
-            </a:extLst>
-          </p:cNvPr>
-          <p:cNvSpPr>
-            <a:spLocks noGrp="1"/>
-          </p:cNvSpPr>
-          <p:nvPr>
-            <p:ph type="title"/>
-          </p:nvPr>
-        </p:nvSpPr>
-        <p:spPr>
-          <a:xfrm>
-            <a:off x="958506" y="800392"/>
-            <a:ext cx="10264697" cy="1212102"/>
-          </a:xfrm>
-        </p:spPr>
-        <p:txBody>
-          <a:bodyPr>
-            <a:normAutofit/>
-          </a:bodyPr>
-          <a:lstStyle/>
-          <a:p>
-            <a:r>
-              <a:rPr lang="fr-FR" sz="4000" dirty="0">
-                <a:solidFill>
-                  <a:srgbClr val="FFFFFF"/>
-                </a:solidFill>
-              </a:rPr>
-              <a:t>Formulaires</a:t>
-            </a:r>
-          </a:p>
-        </p:txBody>
-      </p:sp>
-      <p:sp>
-        <p:nvSpPr>
-          <p:cNvPr id="9" name="Espace réservé du numéro de diapositive 8">
-            <a:extLst>
-              <a:ext uri="{FF2B5EF4-FFF2-40B4-BE49-F238E27FC236}">
-                <a16:creationId xmlns:a16="http://schemas.microsoft.com/office/drawing/2014/main" id="{F3EDF272-70D0-418F-B1E4-090F125EAE69}"/>
-              </a:ext>
-            </a:extLst>
-          </p:cNvPr>
-          <p:cNvSpPr>
-            <a:spLocks noGrp="1"/>
-          </p:cNvSpPr>
-          <p:nvPr>
-            <p:ph type="sldNum" sz="quarter" idx="12"/>
-          </p:nvPr>
-        </p:nvSpPr>
-        <p:spPr/>
-        <p:txBody>
-          <a:bodyPr/>
-          <a:lstStyle/>
-          <a:p>
-            <a:fld id="{F8323CC4-5E62-4ADB-BC7C-89B23C89378E}" type="slidenum">
-              <a:rPr lang="fr-FR" smtClean="0"/>
-              <a:t>27</a:t>
-            </a:fld>
-            <a:endParaRPr lang="fr-FR"/>
-          </a:p>
-        </p:txBody>
-      </p:sp>
-      <p:pic>
-        <p:nvPicPr>
-          <p:cNvPr id="6" name="Image 5">
-            <a:extLst>
-              <a:ext uri="{FF2B5EF4-FFF2-40B4-BE49-F238E27FC236}">
-                <a16:creationId xmlns:a16="http://schemas.microsoft.com/office/drawing/2014/main" id="{F9E1CB56-D2B8-4A38-BA2D-7D9A22393CFB}"/>
-              </a:ext>
-            </a:extLst>
-          </p:cNvPr>
-          <p:cNvPicPr>
-            <a:picLocks noChangeAspect="1"/>
-          </p:cNvPicPr>
-          <p:nvPr/>
-        </p:nvPicPr>
-        <p:blipFill>
-          <a:blip r:embed="rId2"/>
-          <a:stretch>
-            <a:fillRect/>
-          </a:stretch>
-        </p:blipFill>
-        <p:spPr>
-          <a:xfrm>
-            <a:off x="1333481" y="2419171"/>
-            <a:ext cx="3432482" cy="2991360"/>
-          </a:xfrm>
-          <a:prstGeom prst="rect">
-            <a:avLst/>
-          </a:prstGeom>
-        </p:spPr>
-      </p:pic>
-      <p:sp>
-        <p:nvSpPr>
-          <p:cNvPr id="13" name="Flèche : droite 12">
-            <a:extLst>
-              <a:ext uri="{FF2B5EF4-FFF2-40B4-BE49-F238E27FC236}">
-                <a16:creationId xmlns:a16="http://schemas.microsoft.com/office/drawing/2014/main" id="{8AEECA8E-C7FE-469D-B082-99DEF04C93C6}"/>
-              </a:ext>
-            </a:extLst>
-          </p:cNvPr>
-          <p:cNvSpPr/>
-          <p:nvPr/>
-        </p:nvSpPr>
-        <p:spPr>
-          <a:xfrm>
-            <a:off x="4890287" y="3594556"/>
-            <a:ext cx="1205713" cy="480290"/>
-          </a:xfrm>
-          <a:prstGeom prst="rightArrow">
-            <a:avLst/>
-          </a:prstGeom>
-        </p:spPr>
-        <p:style>
-          <a:lnRef idx="2">
-            <a:schemeClr val="accent1">
-              <a:shade val="50000"/>
-            </a:schemeClr>
-          </a:lnRef>
-          <a:fillRef idx="1">
-            <a:schemeClr val="accent1"/>
-          </a:fillRef>
-          <a:effectRef idx="0">
-            <a:schemeClr val="accent1"/>
-          </a:effectRef>
-          <a:fontRef idx="minor">
-            <a:schemeClr val="lt1"/>
-          </a:fontRef>
-        </p:style>
-        <p:txBody>
-          <a:bodyPr rtlCol="0" anchor="ctr"/>
-          <a:lstStyle/>
-          <a:p>
-            <a:pPr algn="ctr"/>
-            <a:endParaRPr lang="fr-FR"/>
-          </a:p>
-        </p:txBody>
-      </p:sp>
-      <p:pic>
-        <p:nvPicPr>
-          <p:cNvPr id="17" name="Image 16">
-            <a:extLst>
-              <a:ext uri="{FF2B5EF4-FFF2-40B4-BE49-F238E27FC236}">
-                <a16:creationId xmlns:a16="http://schemas.microsoft.com/office/drawing/2014/main" id="{6ABDADB3-4AE5-4DA9-BCEB-AC278BE194F3}"/>
-              </a:ext>
-            </a:extLst>
-          </p:cNvPr>
-          <p:cNvPicPr>
-            <a:picLocks noChangeAspect="1"/>
-          </p:cNvPicPr>
-          <p:nvPr/>
-        </p:nvPicPr>
-        <p:blipFill>
-          <a:blip r:embed="rId3"/>
-          <a:stretch>
-            <a:fillRect/>
-          </a:stretch>
-        </p:blipFill>
-        <p:spPr>
-          <a:xfrm>
-            <a:off x="611321" y="6175540"/>
-            <a:ext cx="4829849" cy="419158"/>
-          </a:xfrm>
-          <a:prstGeom prst="rect">
-            <a:avLst/>
-          </a:prstGeom>
-        </p:spPr>
-      </p:pic>
-      <p:pic>
-        <p:nvPicPr>
-          <p:cNvPr id="24" name="Image 23">
-            <a:extLst>
-              <a:ext uri="{FF2B5EF4-FFF2-40B4-BE49-F238E27FC236}">
-                <a16:creationId xmlns:a16="http://schemas.microsoft.com/office/drawing/2014/main" id="{BCDC707A-3153-41FA-8783-D04EC5059B7D}"/>
-              </a:ext>
-            </a:extLst>
-          </p:cNvPr>
-          <p:cNvPicPr>
-            <a:picLocks noChangeAspect="1"/>
-          </p:cNvPicPr>
-          <p:nvPr/>
-        </p:nvPicPr>
-        <p:blipFill>
-          <a:blip r:embed="rId4"/>
-          <a:stretch>
-            <a:fillRect/>
-          </a:stretch>
-        </p:blipFill>
-        <p:spPr>
-          <a:xfrm>
-            <a:off x="7956573" y="6137612"/>
-            <a:ext cx="1190791" cy="466790"/>
-          </a:xfrm>
-          <a:prstGeom prst="rect">
-            <a:avLst/>
-          </a:prstGeom>
-        </p:spPr>
-      </p:pic>
-      <p:pic>
-        <p:nvPicPr>
-          <p:cNvPr id="26" name="Image 25">
-            <a:extLst>
-              <a:ext uri="{FF2B5EF4-FFF2-40B4-BE49-F238E27FC236}">
-                <a16:creationId xmlns:a16="http://schemas.microsoft.com/office/drawing/2014/main" id="{C76A4E75-9AF7-4D99-90F4-6FF0F0C7011D}"/>
-              </a:ext>
-            </a:extLst>
-          </p:cNvPr>
-          <p:cNvPicPr>
-            <a:picLocks noChangeAspect="1"/>
-          </p:cNvPicPr>
-          <p:nvPr/>
-        </p:nvPicPr>
-        <p:blipFill>
-          <a:blip r:embed="rId5"/>
-          <a:stretch>
-            <a:fillRect/>
-          </a:stretch>
-        </p:blipFill>
-        <p:spPr>
-          <a:xfrm>
-            <a:off x="6206209" y="3252500"/>
-            <a:ext cx="5982535" cy="1162212"/>
-          </a:xfrm>
-          <a:prstGeom prst="rect">
-            <a:avLst/>
-          </a:prstGeom>
-        </p:spPr>
-      </p:pic>
-      <p:sp>
-        <p:nvSpPr>
-          <p:cNvPr id="27" name="Flèche : droite 26">
-            <a:extLst>
-              <a:ext uri="{FF2B5EF4-FFF2-40B4-BE49-F238E27FC236}">
-                <a16:creationId xmlns:a16="http://schemas.microsoft.com/office/drawing/2014/main" id="{4C92A56E-DEBE-4611-9F94-4BF3011E108D}"/>
-              </a:ext>
-            </a:extLst>
-          </p:cNvPr>
-          <p:cNvSpPr/>
-          <p:nvPr/>
-        </p:nvSpPr>
-        <p:spPr>
-          <a:xfrm>
-            <a:off x="6118563" y="6055877"/>
-            <a:ext cx="1205713" cy="480290"/>
-          </a:xfrm>
-          <a:prstGeom prst="rightArrow">
-            <a:avLst/>
-          </a:prstGeom>
-        </p:spPr>
-        <p:style>
-          <a:lnRef idx="2">
-            <a:schemeClr val="accent1">
-              <a:shade val="50000"/>
-            </a:schemeClr>
-          </a:lnRef>
-          <a:fillRef idx="1">
-            <a:schemeClr val="accent1"/>
-          </a:fillRef>
-          <a:effectRef idx="0">
-            <a:schemeClr val="accent1"/>
-          </a:effectRef>
-          <a:fontRef idx="minor">
-            <a:schemeClr val="lt1"/>
-          </a:fontRef>
-        </p:style>
-        <p:txBody>
-          <a:bodyPr rtlCol="0" anchor="ctr"/>
-          <a:lstStyle/>
-          <a:p>
-            <a:pPr algn="ctr"/>
-            <a:endParaRPr lang="fr-FR"/>
-          </a:p>
-        </p:txBody>
-      </p:sp>
-      <p:sp>
-        <p:nvSpPr>
-          <p:cNvPr id="28" name="ZoneTexte 27">
-            <a:extLst>
-              <a:ext uri="{FF2B5EF4-FFF2-40B4-BE49-F238E27FC236}">
-                <a16:creationId xmlns:a16="http://schemas.microsoft.com/office/drawing/2014/main" id="{59D4B96E-419E-4D2C-989B-7923B5E816F2}"/>
-              </a:ext>
-            </a:extLst>
-          </p:cNvPr>
-          <p:cNvSpPr txBox="1"/>
-          <p:nvPr/>
-        </p:nvSpPr>
-        <p:spPr>
-          <a:xfrm>
-            <a:off x="4765963" y="5521867"/>
-            <a:ext cx="2807855" cy="461665"/>
-          </a:xfrm>
-          <a:prstGeom prst="rect">
-            <a:avLst/>
-          </a:prstGeom>
-          <a:noFill/>
-        </p:spPr>
-        <p:txBody>
-          <a:bodyPr wrap="square" rtlCol="0">
-            <a:spAutoFit/>
-          </a:bodyPr>
-          <a:lstStyle/>
-          <a:p>
-            <a:r>
-              <a:rPr lang="fr-FR" sz="2400" dirty="0"/>
-              <a:t>Affichage :</a:t>
-            </a:r>
-          </a:p>
-        </p:txBody>
-      </p:sp>
-    </p:spTree>
-    <p:extLst>
-      <p:ext uri="{BB962C8B-B14F-4D97-AF65-F5344CB8AC3E}">
-        <p14:creationId xmlns:p14="http://schemas.microsoft.com/office/powerpoint/2010/main" val="810595131"/>
-      </p:ext>
-    </p:extLst>
-  </p:cSld>
-  <p:clrMapOvr>
-    <a:masterClrMapping/>
-  </p:clrMapOvr>
-</p:sld>
-</file>
-
-<file path=ppt/slides/slide28.xml><?xml version="1.0" encoding="utf-8"?>
-<p:sld xmlns:a="http://schemas.openxmlformats.org/drawingml/2006/main" xmlns:r="http://schemas.openxmlformats.org/officeDocument/2006/relationships" xmlns:p="http://schemas.openxmlformats.org/presentationml/2006/main">
-  <p:cSld>
-    <p:bg>
-      <p:bgPr>
-        <a:solidFill>
-          <a:schemeClr val="bg1"/>
-        </a:solidFill>
-        <a:effectLst/>
-      </p:bgPr>
-    </p:bg>
-    <p:spTree>
-      <p:nvGrpSpPr>
-        <p:cNvPr id="1" name=""/>
-        <p:cNvGrpSpPr/>
-        <p:nvPr/>
-      </p:nvGrpSpPr>
-      <p:grpSpPr>
-        <a:xfrm>
-          <a:off x="0" y="0"/>
-          <a:ext cx="0" cy="0"/>
-          <a:chOff x="0" y="0"/>
-          <a:chExt cx="0" cy="0"/>
-        </a:xfrm>
-      </p:grpSpPr>
       <p:sp>
         <p:nvSpPr>
           <p:cNvPr id="9" name="Rectangle 8">
@@ -16179,13 +15563,72 @@
                   <a:spcPts val="600"/>
                 </a:spcAft>
               </a:pPr>
-              <a:t>28</a:t>
+              <a:t>27</a:t>
             </a:fld>
             <a:endParaRPr lang="en-US" sz="1000">
               <a:solidFill>
                 <a:srgbClr val="898989"/>
               </a:solidFill>
             </a:endParaRPr>
+          </a:p>
+        </p:txBody>
+      </p:sp>
+      <p:sp>
+        <p:nvSpPr>
+          <p:cNvPr id="6" name="Rectangle 5">
+            <a:extLst>
+              <a:ext uri="{FF2B5EF4-FFF2-40B4-BE49-F238E27FC236}">
+                <a16:creationId xmlns:a16="http://schemas.microsoft.com/office/drawing/2014/main" id="{26856DD9-AD13-4E47-95C3-AD8BB9611BA1}"/>
+              </a:ext>
+            </a:extLst>
+          </p:cNvPr>
+          <p:cNvSpPr/>
+          <p:nvPr/>
+        </p:nvSpPr>
+        <p:spPr>
+          <a:xfrm>
+            <a:off x="3045368" y="4493623"/>
+            <a:ext cx="6322422" cy="1123406"/>
+          </a:xfrm>
+          <a:prstGeom prst="rect">
+            <a:avLst/>
+          </a:prstGeom>
+          <a:solidFill>
+            <a:schemeClr val="tx2">
+              <a:lumMod val="40000"/>
+              <a:lumOff val="60000"/>
+            </a:schemeClr>
+          </a:solidFill>
+        </p:spPr>
+        <p:style>
+          <a:lnRef idx="2">
+            <a:schemeClr val="accent1">
+              <a:shade val="50000"/>
+            </a:schemeClr>
+          </a:lnRef>
+          <a:fillRef idx="1">
+            <a:schemeClr val="accent1"/>
+          </a:fillRef>
+          <a:effectRef idx="0">
+            <a:schemeClr val="accent1"/>
+          </a:effectRef>
+          <a:fontRef idx="minor">
+            <a:schemeClr val="lt1"/>
+          </a:fontRef>
+        </p:style>
+        <p:txBody>
+          <a:bodyPr rtlCol="0" anchor="ctr"/>
+          <a:lstStyle/>
+          <a:p>
+            <a:pPr algn="ctr"/>
+            <a:r>
+              <a:rPr lang="fr-FR" dirty="0">
+                <a:solidFill>
+                  <a:schemeClr val="tx1"/>
+                </a:solidFill>
+              </a:rPr>
+              <a:t>Créer un formulaire afin d’ajouter ou de supprimer une personne de la base de données</a:t>
+            </a:r>
           </a:p>
         </p:txBody>
       </p:sp>
@@ -20403,6 +19846,49 @@
           </a:p>
         </p:txBody>
       </p:sp>
+      <p:sp>
+        <p:nvSpPr>
+          <p:cNvPr id="3" name="ZoneTexte 2">
+            <a:extLst>
+              <a:ext uri="{FF2B5EF4-FFF2-40B4-BE49-F238E27FC236}">
+                <a16:creationId xmlns:a16="http://schemas.microsoft.com/office/drawing/2014/main" id="{1C3CAF08-592B-4866-9413-38ADD9E08E82}"/>
+              </a:ext>
+            </a:extLst>
+          </p:cNvPr>
+          <p:cNvSpPr txBox="1"/>
+          <p:nvPr/>
+        </p:nvSpPr>
+        <p:spPr>
+          <a:xfrm>
+            <a:off x="1410789" y="2378076"/>
+            <a:ext cx="5460274" cy="369332"/>
+          </a:xfrm>
+          <a:prstGeom prst="rect">
+            <a:avLst/>
+          </a:prstGeom>
+          <a:noFill/>
+        </p:spPr>
+        <p:txBody>
+          <a:bodyPr wrap="square" rtlCol="0">
+            <a:spAutoFit/>
+          </a:bodyPr>
+          <a:lstStyle/>
+          <a:p>
+            <a:r>
+              <a:rPr lang="fr-FR" dirty="0"/>
+              <a:t>Projet a télécharger sur </a:t>
+            </a:r>
+            <a:r>
+              <a:rPr lang="fr-FR" dirty="0" err="1"/>
+              <a:t>Github</a:t>
+            </a:r>
+            <a:r>
+              <a:rPr lang="fr-FR" dirty="0"/>
+              <a:t> (lien dans le chat)</a:t>
+            </a:r>
+          </a:p>
+        </p:txBody>
+      </p:sp>
     </p:spTree>
     <p:extLst>
       <p:ext uri="{BB962C8B-B14F-4D97-AF65-F5344CB8AC3E}">
@@ -20665,6 +20151,65 @@
                 <a:srgbClr val="898989"/>
               </a:solidFill>
             </a:endParaRPr>
+          </a:p>
+        </p:txBody>
+      </p:sp>
+      <p:sp>
+        <p:nvSpPr>
+          <p:cNvPr id="3" name="Rectangle 2">
+            <a:extLst>
+              <a:ext uri="{FF2B5EF4-FFF2-40B4-BE49-F238E27FC236}">
+                <a16:creationId xmlns:a16="http://schemas.microsoft.com/office/drawing/2014/main" id="{63B25174-B663-4747-A488-7FE18D0797D1}"/>
+              </a:ext>
+            </a:extLst>
+          </p:cNvPr>
+          <p:cNvSpPr/>
+          <p:nvPr/>
+        </p:nvSpPr>
+        <p:spPr>
+          <a:xfrm>
+            <a:off x="3045368" y="4493623"/>
+            <a:ext cx="6322422" cy="1123406"/>
+          </a:xfrm>
+          <a:prstGeom prst="rect">
+            <a:avLst/>
+          </a:prstGeom>
+          <a:solidFill>
+            <a:schemeClr val="tx2">
+              <a:lumMod val="40000"/>
+              <a:lumOff val="60000"/>
+            </a:schemeClr>
+          </a:solidFill>
+        </p:spPr>
+        <p:style>
+          <a:lnRef idx="2">
+            <a:schemeClr val="accent1">
+              <a:shade val="50000"/>
+            </a:schemeClr>
+          </a:lnRef>
+          <a:fillRef idx="1">
+            <a:schemeClr val="accent1"/>
+          </a:fillRef>
+          <a:effectRef idx="0">
+            <a:schemeClr val="accent1"/>
+          </a:effectRef>
+          <a:fontRef idx="minor">
+            <a:schemeClr val="lt1"/>
+          </a:fontRef>
+        </p:style>
+        <p:txBody>
+          <a:bodyPr rtlCol="0" anchor="ctr"/>
+          <a:lstStyle/>
+          <a:p>
+            <a:pPr algn="ctr"/>
+            <a:r>
+              <a:rPr lang="fr-FR" dirty="0">
+                <a:solidFill>
+                  <a:schemeClr val="tx1"/>
+                </a:solidFill>
+              </a:rPr>
+              <a:t>Utilisez PDO pour créer la connexion vers la base de données</a:t>
+            </a:r>
           </a:p>
         </p:txBody>
       </p:sp>
@@ -21315,7 +20860,7 @@
         </p:nvSpPr>
         <p:spPr>
           <a:xfrm>
-            <a:off x="1815737" y="2634888"/>
+            <a:off x="1227057" y="2606511"/>
             <a:ext cx="8634549" cy="461665"/>
           </a:xfrm>
           <a:prstGeom prst="rect">
@@ -21495,14 +21040,137 @@
         </p:blipFill>
         <p:spPr>
           <a:xfrm>
-            <a:off x="3274222" y="3690570"/>
-            <a:ext cx="5717577" cy="729586"/>
+            <a:off x="627345" y="3328347"/>
+            <a:ext cx="7956132" cy="1015235"/>
           </a:xfrm>
           <a:prstGeom prst="rect">
             <a:avLst/>
           </a:prstGeom>
         </p:spPr>
       </p:pic>
+      <p:pic>
+        <p:nvPicPr>
+          <p:cNvPr id="3" name="Image 2">
+            <a:extLst>
+              <a:ext uri="{FF2B5EF4-FFF2-40B4-BE49-F238E27FC236}">
+                <a16:creationId xmlns:a16="http://schemas.microsoft.com/office/drawing/2014/main" id="{5C548AD5-5B1D-44AB-9667-CAAB68E13A9D}"/>
+              </a:ext>
+            </a:extLst>
+          </p:cNvPr>
+          <p:cNvPicPr>
+            <a:picLocks noChangeAspect="1"/>
+          </p:cNvPicPr>
+          <p:nvPr/>
+        </p:nvPicPr>
+        <p:blipFill>
+          <a:blip r:embed="rId5"/>
+          <a:stretch>
+            <a:fillRect/>
+          </a:stretch>
+        </p:blipFill>
+        <p:spPr>
+          <a:xfrm>
+            <a:off x="9415676" y="3117851"/>
+            <a:ext cx="3182986" cy="1242673"/>
+          </a:xfrm>
+          <a:prstGeom prst="rect">
+            <a:avLst/>
+          </a:prstGeom>
+        </p:spPr>
+      </p:pic>
+      <p:sp>
+        <p:nvSpPr>
+          <p:cNvPr id="7" name="ZoneTexte 6">
+            <a:extLst>
+              <a:ext uri="{FF2B5EF4-FFF2-40B4-BE49-F238E27FC236}">
+                <a16:creationId xmlns:a16="http://schemas.microsoft.com/office/drawing/2014/main" id="{2A82C58A-C336-4D1A-982D-345A9B7E1EFF}"/>
+              </a:ext>
+            </a:extLst>
+          </p:cNvPr>
+          <p:cNvSpPr txBox="1"/>
+          <p:nvPr/>
+        </p:nvSpPr>
+        <p:spPr>
+          <a:xfrm>
+            <a:off x="6425472" y="3835964"/>
+            <a:ext cx="2362860" cy="338554"/>
+          </a:xfrm>
+          <a:prstGeom prst="rect">
+            <a:avLst/>
+          </a:prstGeom>
+          <a:solidFill>
+            <a:schemeClr val="bg1"/>
+          </a:solidFill>
+        </p:spPr>
+        <p:txBody>
+          <a:bodyPr wrap="square" rtlCol="0">
+            <a:spAutoFit/>
+          </a:bodyPr>
+          <a:lstStyle/>
+          <a:p>
+            <a:r>
+              <a:rPr lang="fr-FR" sz="1600" dirty="0">
+                <a:solidFill>
+                  <a:srgbClr val="FF0000"/>
+                </a:solidFill>
+              </a:rPr>
+              <a:t>Contenu du champs table</a:t>
+            </a:r>
+          </a:p>
+        </p:txBody>
+      </p:sp>
+      <p:sp>
+        <p:nvSpPr>
+          <p:cNvPr id="11" name="Rectangle 10">
+            <a:extLst>
+              <a:ext uri="{FF2B5EF4-FFF2-40B4-BE49-F238E27FC236}">
+                <a16:creationId xmlns:a16="http://schemas.microsoft.com/office/drawing/2014/main" id="{A21D5B39-8064-46DA-A963-DB33B14FD3AF}"/>
+              </a:ext>
+            </a:extLst>
+          </p:cNvPr>
+          <p:cNvSpPr/>
+          <p:nvPr/>
+        </p:nvSpPr>
+        <p:spPr>
+          <a:xfrm>
+            <a:off x="9415676" y="3117851"/>
+            <a:ext cx="3007101" cy="510095"/>
+          </a:xfrm>
+          <a:prstGeom prst="rect">
+            <a:avLst/>
+          </a:prstGeom>
+          <a:noFill/>
+          <a:ln>
+            <a:solidFill>
+              <a:srgbClr val="FF0000"/>
+            </a:solidFill>
+          </a:ln>
+        </p:spPr>
+        <p:style>
+          <a:lnRef idx="2">
+            <a:schemeClr val="accent1">
+              <a:shade val="50000"/>
+            </a:schemeClr>
+          </a:lnRef>
+          <a:fillRef idx="1">
+            <a:schemeClr val="accent1"/>
+          </a:fillRef>
+          <a:effectRef idx="0">
+            <a:schemeClr val="accent1"/>
+          </a:effectRef>
+          <a:fontRef idx="minor">
+            <a:schemeClr val="lt1"/>
+          </a:fontRef>
+        </p:style>
+        <p:txBody>
+          <a:bodyPr rtlCol="0" anchor="ctr"/>
+          <a:lstStyle/>
+          <a:p>
+            <a:pPr algn="ctr"/>
+            <a:endParaRPr lang="fr-FR"/>
+          </a:p>
+        </p:txBody>
+      </p:sp>
     </p:spTree>
     <p:extLst>
       <p:ext uri="{BB962C8B-B14F-4D97-AF65-F5344CB8AC3E}">

</xml_diff>